<commit_message>
mlmi workshop works modifications 11092020
</commit_message>
<xml_diff>
--- a/mlmi-workshop/MLMI Presentation-JMS.pptx
+++ b/mlmi-workshop/MLMI Presentation-JMS.pptx
@@ -5,7 +5,7 @@
     <p:sldMasterId id="2147483660" r:id="rId1"/>
   </p:sldMasterIdLst>
   <p:notesMasterIdLst>
-    <p:notesMasterId r:id="rId16"/>
+    <p:notesMasterId r:id="rId17"/>
   </p:notesMasterIdLst>
   <p:sldIdLst>
     <p:sldId id="318" r:id="rId2"/>
@@ -22,6 +22,7 @@
     <p:sldId id="326" r:id="rId13"/>
     <p:sldId id="333" r:id="rId14"/>
     <p:sldId id="283" r:id="rId15"/>
+    <p:sldId id="337" r:id="rId16"/>
   </p:sldIdLst>
   <p:sldSz cx="12192000" cy="6858000"/>
   <p:notesSz cx="6858000" cy="9144000"/>
@@ -213,7 +214,7 @@
           <a:p>
             <a:fld id="{7EDE81C4-4A71-6147-B907-5A29BE5FB6F2}" type="datetimeFigureOut">
               <a:rPr lang="en-US" smtClean="0"/>
-              <a:t>9/10/20</a:t>
+              <a:t>9/11/20</a:t>
             </a:fld>
             <a:endParaRPr lang="en-US"/>
           </a:p>
@@ -1073,6 +1074,90 @@
 </p:notes>
 </file>
 
+<file path=ppt/notesSlides/notesSlide15.xml><?xml version="1.0" encoding="utf-8"?>
+<p:notes xmlns:a="http://schemas.openxmlformats.org/drawingml/2006/main" xmlns:r="http://schemas.openxmlformats.org/officeDocument/2006/relationships" xmlns:p="http://schemas.openxmlformats.org/presentationml/2006/main">
+  <p:cSld>
+    <p:spTree>
+      <p:nvGrpSpPr>
+        <p:cNvPr id="1" name=""/>
+        <p:cNvGrpSpPr/>
+        <p:nvPr/>
+      </p:nvGrpSpPr>
+      <p:grpSpPr>
+        <a:xfrm>
+          <a:off x="0" y="0"/>
+          <a:ext cx="0" cy="0"/>
+          <a:chOff x="0" y="0"/>
+          <a:chExt cx="0" cy="0"/>
+        </a:xfrm>
+      </p:grpSpPr>
+      <p:sp>
+        <p:nvSpPr>
+          <p:cNvPr id="2" name="Slide Image Placeholder 1"/>
+          <p:cNvSpPr>
+            <a:spLocks noGrp="1" noRot="1" noChangeAspect="1"/>
+          </p:cNvSpPr>
+          <p:nvPr>
+            <p:ph type="sldImg"/>
+          </p:nvPr>
+        </p:nvSpPr>
+        <p:spPr/>
+      </p:sp>
+      <p:sp>
+        <p:nvSpPr>
+          <p:cNvPr id="3" name="Notes Placeholder 2"/>
+          <p:cNvSpPr>
+            <a:spLocks noGrp="1"/>
+          </p:cNvSpPr>
+          <p:nvPr>
+            <p:ph type="body" idx="1"/>
+          </p:nvPr>
+        </p:nvSpPr>
+        <p:spPr/>
+        <p:txBody>
+          <a:bodyPr/>
+          <a:lstStyle/>
+          <a:p>
+            <a:endParaRPr lang="en-US"/>
+          </a:p>
+        </p:txBody>
+      </p:sp>
+      <p:sp>
+        <p:nvSpPr>
+          <p:cNvPr id="4" name="Slide Number Placeholder 3"/>
+          <p:cNvSpPr>
+            <a:spLocks noGrp="1"/>
+          </p:cNvSpPr>
+          <p:nvPr>
+            <p:ph type="sldNum" sz="quarter" idx="5"/>
+          </p:nvPr>
+        </p:nvSpPr>
+        <p:spPr/>
+        <p:txBody>
+          <a:bodyPr/>
+          <a:lstStyle/>
+          <a:p>
+            <a:fld id="{C30285B6-B79A-704D-974B-159E00AE1743}" type="slidenum">
+              <a:rPr lang="en-US" smtClean="0"/>
+              <a:t>14</a:t>
+            </a:fld>
+            <a:endParaRPr lang="en-US"/>
+          </a:p>
+        </p:txBody>
+      </p:sp>
+    </p:spTree>
+    <p:extLst>
+      <p:ext uri="{BB962C8B-B14F-4D97-AF65-F5344CB8AC3E}">
+        <p14:creationId xmlns:p14="http://schemas.microsoft.com/office/powerpoint/2010/main" val="105994296"/>
+      </p:ext>
+    </p:extLst>
+  </p:cSld>
+  <p:clrMapOvr>
+    <a:masterClrMapping/>
+  </p:clrMapOvr>
+</p:notes>
+</file>
+
 <file path=ppt/notesSlides/notesSlide2.xml><?xml version="1.0" encoding="utf-8"?>
 <p:notes xmlns:a="http://schemas.openxmlformats.org/drawingml/2006/main" xmlns:r="http://schemas.openxmlformats.org/officeDocument/2006/relationships" xmlns:p="http://schemas.openxmlformats.org/presentationml/2006/main">
   <p:cSld>
@@ -2055,7 +2140,7 @@
           <a:p>
             <a:fld id="{E711F6B9-09E3-264D-B911-B6748EE4FD25}" type="datetime1">
               <a:rPr lang="de-DE" smtClean="0"/>
-              <a:t>10.09.20</a:t>
+              <a:t>11.09.20</a:t>
             </a:fld>
             <a:endParaRPr lang="en-US"/>
           </a:p>
@@ -2207,7 +2292,7 @@
           <a:p>
             <a:fld id="{8D6EE3F7-5D0E-CF40-8110-E2773D7F3EC5}" type="datetime1">
               <a:rPr lang="de-DE" smtClean="0"/>
-              <a:t>10.09.20</a:t>
+              <a:t>11.09.20</a:t>
             </a:fld>
             <a:endParaRPr lang="en-US"/>
           </a:p>
@@ -2431,7 +2516,7 @@
           <a:p>
             <a:fld id="{EA97F92A-9F35-FA49-9E15-CF370BF909A6}" type="datetime1">
               <a:rPr lang="de-DE" smtClean="0"/>
-              <a:t>10.09.20</a:t>
+              <a:t>11.09.20</a:t>
             </a:fld>
             <a:endParaRPr lang="en-US"/>
           </a:p>
@@ -3027,7 +3112,7 @@
           <a:p>
             <a:fld id="{BD669376-BA49-AA41-8BFC-6F94358A0AB4}" type="datetime1">
               <a:rPr lang="de-DE" smtClean="0"/>
-              <a:t>10.09.20</a:t>
+              <a:t>11.09.20</a:t>
             </a:fld>
             <a:endParaRPr lang="en-US"/>
           </a:p>
@@ -3275,7 +3360,7 @@
           <a:p>
             <a:fld id="{CD50BE3D-4964-AC43-8067-447D5126BD32}" type="datetime1">
               <a:rPr lang="de-DE" smtClean="0"/>
-              <a:t>10.09.20</a:t>
+              <a:t>11.09.20</a:t>
             </a:fld>
             <a:endParaRPr lang="en-US"/>
           </a:p>
@@ -3703,7 +3788,7 @@
           <a:p>
             <a:fld id="{4F98BE7D-FD9E-4D4D-B63F-FD23C942A734}" type="datetime1">
               <a:rPr lang="de-DE" smtClean="0"/>
-              <a:t>10.09.20</a:t>
+              <a:t>11.09.20</a:t>
             </a:fld>
             <a:endParaRPr lang="en-US"/>
           </a:p>
@@ -3860,7 +3945,7 @@
           <a:p>
             <a:fld id="{AA34F5DE-5439-9F49-9A0A-B425CC1E9792}" type="datetime1">
               <a:rPr lang="de-DE" smtClean="0"/>
-              <a:t>10.09.20</a:t>
+              <a:t>11.09.20</a:t>
             </a:fld>
             <a:endParaRPr lang="en-US"/>
           </a:p>
@@ -3989,7 +4074,7 @@
           <a:p>
             <a:fld id="{2354DFAC-CF9C-E04E-8ADF-1935F5ADA27A}" type="datetime1">
               <a:rPr lang="de-DE" smtClean="0"/>
-              <a:t>10.09.20</a:t>
+              <a:t>11.09.20</a:t>
             </a:fld>
             <a:endParaRPr lang="en-US"/>
           </a:p>
@@ -4316,7 +4401,7 @@
           <a:p>
             <a:fld id="{32565454-3FCF-214B-B9F3-13FBDC6AD5C1}" type="datetime1">
               <a:rPr lang="de-DE" smtClean="0"/>
-              <a:t>10.09.20</a:t>
+              <a:t>11.09.20</a:t>
             </a:fld>
             <a:endParaRPr lang="en-US"/>
           </a:p>
@@ -4623,7 +4708,7 @@
           <a:p>
             <a:fld id="{A9C716EC-92C3-084B-B3CE-5B8C359BCFBF}" type="datetime1">
               <a:rPr lang="de-DE" smtClean="0"/>
-              <a:t>10.09.20</a:t>
+              <a:t>11.09.20</a:t>
             </a:fld>
             <a:endParaRPr lang="en-US"/>
           </a:p>
@@ -8362,6 +8447,2674 @@
     <p:extLst>
       <p:ext uri="{BB962C8B-B14F-4D97-AF65-F5344CB8AC3E}">
         <p14:creationId xmlns:p14="http://schemas.microsoft.com/office/powerpoint/2010/main" val="2394299028"/>
+      </p:ext>
+    </p:extLst>
+  </p:cSld>
+  <p:clrMapOvr>
+    <a:masterClrMapping/>
+  </p:clrMapOvr>
+</p:sld>
+</file>
+
+<file path=ppt/slides/slide15.xml><?xml version="1.0" encoding="utf-8"?>
+<p:sld xmlns:a="http://schemas.openxmlformats.org/drawingml/2006/main" xmlns:r="http://schemas.openxmlformats.org/officeDocument/2006/relationships" xmlns:p="http://schemas.openxmlformats.org/presentationml/2006/main">
+  <p:cSld>
+    <p:spTree>
+      <p:nvGrpSpPr>
+        <p:cNvPr id="1" name=""/>
+        <p:cNvGrpSpPr/>
+        <p:nvPr/>
+      </p:nvGrpSpPr>
+      <p:grpSpPr>
+        <a:xfrm>
+          <a:off x="0" y="0"/>
+          <a:ext cx="0" cy="0"/>
+          <a:chOff x="0" y="0"/>
+          <a:chExt cx="0" cy="0"/>
+        </a:xfrm>
+      </p:grpSpPr>
+      <p:sp>
+        <p:nvSpPr>
+          <p:cNvPr id="57" name="Rectangle 56">
+            <a:extLst>
+              <a:ext uri="{FF2B5EF4-FFF2-40B4-BE49-F238E27FC236}">
+                <a16:creationId xmlns:a16="http://schemas.microsoft.com/office/drawing/2014/main" id="{D4E3F1D1-D0E3-CA46-8528-2AAA2535B8FE}"/>
+              </a:ext>
+            </a:extLst>
+          </p:cNvPr>
+          <p:cNvSpPr/>
+          <p:nvPr/>
+        </p:nvSpPr>
+        <p:spPr>
+          <a:xfrm>
+            <a:off x="4304518" y="1114555"/>
+            <a:ext cx="1170804" cy="5077137"/>
+          </a:xfrm>
+          <a:prstGeom prst="rect">
+            <a:avLst/>
+          </a:prstGeom>
+          <a:solidFill>
+            <a:srgbClr val="FFC000">
+              <a:alpha val="20000"/>
+            </a:srgbClr>
+          </a:solidFill>
+          <a:ln w="25400">
+            <a:noFill/>
+          </a:ln>
+        </p:spPr>
+        <p:style>
+          <a:lnRef idx="2">
+            <a:schemeClr val="accent1">
+              <a:shade val="50000"/>
+            </a:schemeClr>
+          </a:lnRef>
+          <a:fillRef idx="1">
+            <a:schemeClr val="accent1"/>
+          </a:fillRef>
+          <a:effectRef idx="0">
+            <a:schemeClr val="accent1"/>
+          </a:effectRef>
+          <a:fontRef idx="minor">
+            <a:schemeClr val="lt1"/>
+          </a:fontRef>
+        </p:style>
+        <p:txBody>
+          <a:bodyPr rtlCol="0" anchor="ctr"/>
+          <a:lstStyle/>
+          <a:p>
+            <a:pPr algn="ctr"/>
+            <a:endParaRPr lang="en-US" dirty="0"/>
+          </a:p>
+        </p:txBody>
+      </p:sp>
+      <p:grpSp>
+        <p:nvGrpSpPr>
+          <p:cNvPr id="48" name="Group 47">
+            <a:extLst>
+              <a:ext uri="{FF2B5EF4-FFF2-40B4-BE49-F238E27FC236}">
+                <a16:creationId xmlns:a16="http://schemas.microsoft.com/office/drawing/2014/main" id="{FB5D2DE4-39F6-F04B-ACC9-EFD48F081DBB}"/>
+              </a:ext>
+            </a:extLst>
+          </p:cNvPr>
+          <p:cNvGrpSpPr/>
+          <p:nvPr/>
+        </p:nvGrpSpPr>
+        <p:grpSpPr>
+          <a:xfrm>
+            <a:off x="2684519" y="5154623"/>
+            <a:ext cx="1278452" cy="889395"/>
+            <a:chOff x="3066175" y="3994299"/>
+            <a:chExt cx="1141065" cy="1024668"/>
+          </a:xfrm>
+        </p:grpSpPr>
+        <p:pic>
+          <p:nvPicPr>
+            <p:cNvPr id="36" name="Picture 35">
+              <a:extLst>
+                <a:ext uri="{FF2B5EF4-FFF2-40B4-BE49-F238E27FC236}">
+                  <a16:creationId xmlns:a16="http://schemas.microsoft.com/office/drawing/2014/main" id="{86F2DCCF-E9E1-DA4A-924A-BA4B3B39610E}"/>
+                </a:ext>
+              </a:extLst>
+            </p:cNvPr>
+            <p:cNvPicPr>
+              <a:picLocks noChangeAspect="1"/>
+            </p:cNvPicPr>
+            <p:nvPr/>
+          </p:nvPicPr>
+          <p:blipFill>
+            <a:blip r:embed="rId3"/>
+            <a:stretch>
+              <a:fillRect/>
+            </a:stretch>
+          </p:blipFill>
+          <p:spPr>
+            <a:xfrm>
+              <a:off x="3132512" y="4127871"/>
+              <a:ext cx="961423" cy="863111"/>
+            </a:xfrm>
+            <a:prstGeom prst="rect">
+              <a:avLst/>
+            </a:prstGeom>
+          </p:spPr>
+        </p:pic>
+        <p:sp>
+          <p:nvSpPr>
+            <p:cNvPr id="30" name="Rectangle 29">
+              <a:extLst>
+                <a:ext uri="{FF2B5EF4-FFF2-40B4-BE49-F238E27FC236}">
+                  <a16:creationId xmlns:a16="http://schemas.microsoft.com/office/drawing/2014/main" id="{B2404962-2795-A148-92E8-0E34C0FAFF4E}"/>
+                </a:ext>
+              </a:extLst>
+            </p:cNvPr>
+            <p:cNvSpPr/>
+            <p:nvPr/>
+          </p:nvSpPr>
+          <p:spPr>
+            <a:xfrm>
+              <a:off x="3066175" y="3994299"/>
+              <a:ext cx="1141065" cy="1024668"/>
+            </a:xfrm>
+            <a:prstGeom prst="rect">
+              <a:avLst/>
+            </a:prstGeom>
+            <a:noFill/>
+            <a:ln>
+              <a:solidFill>
+                <a:schemeClr val="tx1">
+                  <a:lumMod val="50000"/>
+                </a:schemeClr>
+              </a:solidFill>
+            </a:ln>
+          </p:spPr>
+          <p:style>
+            <a:lnRef idx="2">
+              <a:schemeClr val="accent1">
+                <a:shade val="50000"/>
+              </a:schemeClr>
+            </a:lnRef>
+            <a:fillRef idx="1">
+              <a:schemeClr val="accent1"/>
+            </a:fillRef>
+            <a:effectRef idx="0">
+              <a:schemeClr val="accent1"/>
+            </a:effectRef>
+            <a:fontRef idx="minor">
+              <a:schemeClr val="lt1"/>
+            </a:fontRef>
+          </p:style>
+          <p:txBody>
+            <a:bodyPr rtlCol="0" anchor="ctr"/>
+            <a:lstStyle/>
+            <a:p>
+              <a:pPr algn="ctr"/>
+              <a:endParaRPr lang="en-US" dirty="0"/>
+            </a:p>
+          </p:txBody>
+        </p:sp>
+      </p:grpSp>
+      <p:grpSp>
+        <p:nvGrpSpPr>
+          <p:cNvPr id="46" name="Group 45">
+            <a:extLst>
+              <a:ext uri="{FF2B5EF4-FFF2-40B4-BE49-F238E27FC236}">
+                <a16:creationId xmlns:a16="http://schemas.microsoft.com/office/drawing/2014/main" id="{AA48356A-3CBB-B14B-80CE-1AF8385C024B}"/>
+              </a:ext>
+            </a:extLst>
+          </p:cNvPr>
+          <p:cNvGrpSpPr/>
+          <p:nvPr/>
+        </p:nvGrpSpPr>
+        <p:grpSpPr>
+          <a:xfrm>
+            <a:off x="2684519" y="3899853"/>
+            <a:ext cx="1278452" cy="837788"/>
+            <a:chOff x="3066175" y="2192014"/>
+            <a:chExt cx="1141065" cy="762000"/>
+          </a:xfrm>
+        </p:grpSpPr>
+        <p:pic>
+          <p:nvPicPr>
+            <p:cNvPr id="35" name="Picture 34" descr="A picture containing toy, clock&#10;&#10;Description automatically generated">
+              <a:extLst>
+                <a:ext uri="{FF2B5EF4-FFF2-40B4-BE49-F238E27FC236}">
+                  <a16:creationId xmlns:a16="http://schemas.microsoft.com/office/drawing/2014/main" id="{FC7D648E-96E1-D84E-8225-4FF3716AD09A}"/>
+                </a:ext>
+              </a:extLst>
+            </p:cNvPr>
+            <p:cNvPicPr>
+              <a:picLocks noChangeAspect="1"/>
+            </p:cNvPicPr>
+            <p:nvPr/>
+          </p:nvPicPr>
+          <p:blipFill>
+            <a:blip r:embed="rId4"/>
+            <a:stretch>
+              <a:fillRect/>
+            </a:stretch>
+          </p:blipFill>
+          <p:spPr>
+            <a:xfrm>
+              <a:off x="3132512" y="2335319"/>
+              <a:ext cx="961423" cy="536748"/>
+            </a:xfrm>
+            <a:prstGeom prst="rect">
+              <a:avLst/>
+            </a:prstGeom>
+          </p:spPr>
+        </p:pic>
+        <p:sp>
+          <p:nvSpPr>
+            <p:cNvPr id="31" name="Rectangle 30">
+              <a:extLst>
+                <a:ext uri="{FF2B5EF4-FFF2-40B4-BE49-F238E27FC236}">
+                  <a16:creationId xmlns:a16="http://schemas.microsoft.com/office/drawing/2014/main" id="{8B10C9B4-DAE9-BF47-853C-AE48331C87D4}"/>
+                </a:ext>
+              </a:extLst>
+            </p:cNvPr>
+            <p:cNvSpPr/>
+            <p:nvPr/>
+          </p:nvSpPr>
+          <p:spPr>
+            <a:xfrm>
+              <a:off x="3066175" y="2192014"/>
+              <a:ext cx="1141065" cy="762000"/>
+            </a:xfrm>
+            <a:prstGeom prst="rect">
+              <a:avLst/>
+            </a:prstGeom>
+            <a:noFill/>
+            <a:ln>
+              <a:solidFill>
+                <a:schemeClr val="tx1">
+                  <a:lumMod val="50000"/>
+                </a:schemeClr>
+              </a:solidFill>
+            </a:ln>
+          </p:spPr>
+          <p:style>
+            <a:lnRef idx="2">
+              <a:schemeClr val="accent1">
+                <a:shade val="50000"/>
+              </a:schemeClr>
+            </a:lnRef>
+            <a:fillRef idx="1">
+              <a:schemeClr val="accent1"/>
+            </a:fillRef>
+            <a:effectRef idx="0">
+              <a:schemeClr val="accent1"/>
+            </a:effectRef>
+            <a:fontRef idx="minor">
+              <a:schemeClr val="lt1"/>
+            </a:fontRef>
+          </p:style>
+          <p:txBody>
+            <a:bodyPr rtlCol="0" anchor="ctr"/>
+            <a:lstStyle/>
+            <a:p>
+              <a:pPr algn="ctr"/>
+              <a:endParaRPr lang="en-US" dirty="0"/>
+            </a:p>
+          </p:txBody>
+        </p:sp>
+      </p:grpSp>
+      <p:pic>
+        <p:nvPicPr>
+          <p:cNvPr id="34" name="Picture 33" descr="A picture containing clock&#10;&#10;Description automatically generated">
+            <a:extLst>
+              <a:ext uri="{FF2B5EF4-FFF2-40B4-BE49-F238E27FC236}">
+                <a16:creationId xmlns:a16="http://schemas.microsoft.com/office/drawing/2014/main" id="{1DC9081A-641A-0C44-9DF2-9DD5EB6F235A}"/>
+              </a:ext>
+            </a:extLst>
+          </p:cNvPr>
+          <p:cNvPicPr>
+            <a:picLocks noChangeAspect="1"/>
+          </p:cNvPicPr>
+          <p:nvPr/>
+        </p:nvPicPr>
+        <p:blipFill>
+          <a:blip r:embed="rId5"/>
+          <a:stretch>
+            <a:fillRect/>
+          </a:stretch>
+        </p:blipFill>
+        <p:spPr>
+          <a:xfrm>
+            <a:off x="2756269" y="2827575"/>
+            <a:ext cx="1039904" cy="583772"/>
+          </a:xfrm>
+          <a:prstGeom prst="rect">
+            <a:avLst/>
+          </a:prstGeom>
+        </p:spPr>
+      </p:pic>
+      <p:grpSp>
+        <p:nvGrpSpPr>
+          <p:cNvPr id="45" name="Group 44">
+            <a:extLst>
+              <a:ext uri="{FF2B5EF4-FFF2-40B4-BE49-F238E27FC236}">
+                <a16:creationId xmlns:a16="http://schemas.microsoft.com/office/drawing/2014/main" id="{8159AB3E-28D0-6B41-81F4-5DA2946A74E6}"/>
+              </a:ext>
+            </a:extLst>
+          </p:cNvPr>
+          <p:cNvGrpSpPr/>
+          <p:nvPr/>
+        </p:nvGrpSpPr>
+        <p:grpSpPr>
+          <a:xfrm>
+            <a:off x="2684518" y="1471564"/>
+            <a:ext cx="1278453" cy="835825"/>
+            <a:chOff x="3066200" y="1295034"/>
+            <a:chExt cx="1141065" cy="762000"/>
+          </a:xfrm>
+        </p:grpSpPr>
+        <p:sp>
+          <p:nvSpPr>
+            <p:cNvPr id="28" name="Rectangle 27">
+              <a:extLst>
+                <a:ext uri="{FF2B5EF4-FFF2-40B4-BE49-F238E27FC236}">
+                  <a16:creationId xmlns:a16="http://schemas.microsoft.com/office/drawing/2014/main" id="{055B1B48-B6B9-CF48-BB81-D0C40C528119}"/>
+                </a:ext>
+              </a:extLst>
+            </p:cNvPr>
+            <p:cNvSpPr/>
+            <p:nvPr/>
+          </p:nvSpPr>
+          <p:spPr>
+            <a:xfrm>
+              <a:off x="3066200" y="1295034"/>
+              <a:ext cx="1141065" cy="762000"/>
+            </a:xfrm>
+            <a:prstGeom prst="rect">
+              <a:avLst/>
+            </a:prstGeom>
+            <a:noFill/>
+            <a:ln>
+              <a:solidFill>
+                <a:schemeClr val="tx1">
+                  <a:lumMod val="50000"/>
+                </a:schemeClr>
+              </a:solidFill>
+            </a:ln>
+          </p:spPr>
+          <p:style>
+            <a:lnRef idx="2">
+              <a:schemeClr val="accent1">
+                <a:shade val="50000"/>
+              </a:schemeClr>
+            </a:lnRef>
+            <a:fillRef idx="1">
+              <a:schemeClr val="accent1"/>
+            </a:fillRef>
+            <a:effectRef idx="0">
+              <a:schemeClr val="accent1"/>
+            </a:effectRef>
+            <a:fontRef idx="minor">
+              <a:schemeClr val="lt1"/>
+            </a:fontRef>
+          </p:style>
+          <p:txBody>
+            <a:bodyPr rtlCol="0" anchor="ctr"/>
+            <a:lstStyle/>
+            <a:p>
+              <a:pPr algn="ctr"/>
+              <a:endParaRPr lang="en-US" dirty="0"/>
+            </a:p>
+          </p:txBody>
+        </p:sp>
+        <p:pic>
+          <p:nvPicPr>
+            <p:cNvPr id="33" name="Picture 32" descr="A picture containing drawing, shirt&#10;&#10;Description automatically generated">
+              <a:extLst>
+                <a:ext uri="{FF2B5EF4-FFF2-40B4-BE49-F238E27FC236}">
+                  <a16:creationId xmlns:a16="http://schemas.microsoft.com/office/drawing/2014/main" id="{C8939C8E-E297-1A44-8701-029C98868447}"/>
+                </a:ext>
+              </a:extLst>
+            </p:cNvPr>
+            <p:cNvPicPr>
+              <a:picLocks noChangeAspect="1"/>
+            </p:cNvPicPr>
+            <p:nvPr/>
+          </p:nvPicPr>
+          <p:blipFill>
+            <a:blip r:embed="rId6"/>
+            <a:stretch>
+              <a:fillRect/>
+            </a:stretch>
+          </p:blipFill>
+          <p:spPr>
+            <a:xfrm>
+              <a:off x="3156002" y="1404103"/>
+              <a:ext cx="961421" cy="576537"/>
+            </a:xfrm>
+            <a:prstGeom prst="rect">
+              <a:avLst/>
+            </a:prstGeom>
+            <a:solidFill>
+              <a:srgbClr val="FFFFFF"/>
+            </a:solidFill>
+          </p:spPr>
+        </p:pic>
+      </p:grpSp>
+      <p:sp>
+        <p:nvSpPr>
+          <p:cNvPr id="26" name="Rectangle 25">
+            <a:extLst>
+              <a:ext uri="{FF2B5EF4-FFF2-40B4-BE49-F238E27FC236}">
+                <a16:creationId xmlns:a16="http://schemas.microsoft.com/office/drawing/2014/main" id="{997ED663-8ACE-004C-8317-15C06CF609CB}"/>
+              </a:ext>
+            </a:extLst>
+          </p:cNvPr>
+          <p:cNvSpPr/>
+          <p:nvPr/>
+        </p:nvSpPr>
+        <p:spPr>
+          <a:xfrm>
+            <a:off x="2476049" y="1114555"/>
+            <a:ext cx="1699601" cy="5077137"/>
+          </a:xfrm>
+          <a:prstGeom prst="rect">
+            <a:avLst/>
+          </a:prstGeom>
+          <a:solidFill>
+            <a:schemeClr val="tx1">
+              <a:lumMod val="90000"/>
+              <a:alpha val="30000"/>
+            </a:schemeClr>
+          </a:solidFill>
+          <a:ln>
+            <a:noFill/>
+          </a:ln>
+        </p:spPr>
+        <p:style>
+          <a:lnRef idx="2">
+            <a:schemeClr val="accent1">
+              <a:shade val="50000"/>
+            </a:schemeClr>
+          </a:lnRef>
+          <a:fillRef idx="1">
+            <a:schemeClr val="accent1"/>
+          </a:fillRef>
+          <a:effectRef idx="0">
+            <a:schemeClr val="accent1"/>
+          </a:effectRef>
+          <a:fontRef idx="minor">
+            <a:schemeClr val="lt1"/>
+          </a:fontRef>
+        </p:style>
+        <p:txBody>
+          <a:bodyPr rtlCol="0" anchor="ctr"/>
+          <a:lstStyle/>
+          <a:p>
+            <a:pPr algn="ctr"/>
+            <a:endParaRPr lang="en-US" dirty="0"/>
+          </a:p>
+        </p:txBody>
+      </p:sp>
+      <p:sp>
+        <p:nvSpPr>
+          <p:cNvPr id="64" name="Line Callout 2 63">
+            <a:extLst>
+              <a:ext uri="{FF2B5EF4-FFF2-40B4-BE49-F238E27FC236}">
+                <a16:creationId xmlns:a16="http://schemas.microsoft.com/office/drawing/2014/main" id="{EFB69AF5-6C24-B443-A18B-C28F161A367C}"/>
+              </a:ext>
+            </a:extLst>
+          </p:cNvPr>
+          <p:cNvSpPr/>
+          <p:nvPr/>
+        </p:nvSpPr>
+        <p:spPr>
+          <a:xfrm>
+            <a:off x="9181872" y="3992891"/>
+            <a:ext cx="2418735" cy="2173401"/>
+          </a:xfrm>
+          <a:prstGeom prst="borderCallout2">
+            <a:avLst>
+              <a:gd name="adj1" fmla="val 90500"/>
+              <a:gd name="adj2" fmla="val -76"/>
+              <a:gd name="adj3" fmla="val 90684"/>
+              <a:gd name="adj4" fmla="val -17887"/>
+              <a:gd name="adj5" fmla="val 5880"/>
+              <a:gd name="adj6" fmla="val -64071"/>
+            </a:avLst>
+          </a:prstGeom>
+          <a:solidFill>
+            <a:schemeClr val="tx1">
+              <a:lumMod val="90000"/>
+              <a:alpha val="10000"/>
+            </a:schemeClr>
+          </a:solidFill>
+          <a:ln w="25400"/>
+        </p:spPr>
+        <p:style>
+          <a:lnRef idx="2">
+            <a:schemeClr val="accent1">
+              <a:shade val="50000"/>
+            </a:schemeClr>
+          </a:lnRef>
+          <a:fillRef idx="1">
+            <a:schemeClr val="accent1"/>
+          </a:fillRef>
+          <a:effectRef idx="0">
+            <a:schemeClr val="accent1"/>
+          </a:effectRef>
+          <a:fontRef idx="minor">
+            <a:schemeClr val="lt1"/>
+          </a:fontRef>
+        </p:style>
+        <p:txBody>
+          <a:bodyPr rtlCol="0" anchor="ctr"/>
+          <a:lstStyle/>
+          <a:p>
+            <a:pPr algn="ctr"/>
+            <a:endParaRPr lang="en-US"/>
+          </a:p>
+        </p:txBody>
+      </p:sp>
+      <p:sp>
+        <p:nvSpPr>
+          <p:cNvPr id="63" name="Line Callout 2 62">
+            <a:extLst>
+              <a:ext uri="{FF2B5EF4-FFF2-40B4-BE49-F238E27FC236}">
+                <a16:creationId xmlns:a16="http://schemas.microsoft.com/office/drawing/2014/main" id="{E295B426-F73E-8945-9458-16EB8F9A6713}"/>
+              </a:ext>
+            </a:extLst>
+          </p:cNvPr>
+          <p:cNvSpPr/>
+          <p:nvPr/>
+        </p:nvSpPr>
+        <p:spPr>
+          <a:xfrm>
+            <a:off x="9183357" y="1086305"/>
+            <a:ext cx="2418735" cy="2075575"/>
+          </a:xfrm>
+          <a:prstGeom prst="borderCallout2">
+            <a:avLst>
+              <a:gd name="adj1" fmla="val 18942"/>
+              <a:gd name="adj2" fmla="val -26"/>
+              <a:gd name="adj3" fmla="val 18750"/>
+              <a:gd name="adj4" fmla="val -16667"/>
+              <a:gd name="adj5" fmla="val 75550"/>
+              <a:gd name="adj6" fmla="val -61301"/>
+            </a:avLst>
+          </a:prstGeom>
+          <a:solidFill>
+            <a:schemeClr val="tx1">
+              <a:lumMod val="90000"/>
+              <a:alpha val="10000"/>
+            </a:schemeClr>
+          </a:solidFill>
+          <a:ln w="25400"/>
+        </p:spPr>
+        <p:style>
+          <a:lnRef idx="2">
+            <a:schemeClr val="accent1">
+              <a:shade val="50000"/>
+            </a:schemeClr>
+          </a:lnRef>
+          <a:fillRef idx="1">
+            <a:schemeClr val="accent1"/>
+          </a:fillRef>
+          <a:effectRef idx="0">
+            <a:schemeClr val="accent1"/>
+          </a:effectRef>
+          <a:fontRef idx="minor">
+            <a:schemeClr val="lt1"/>
+          </a:fontRef>
+        </p:style>
+        <p:txBody>
+          <a:bodyPr rtlCol="0" anchor="ctr"/>
+          <a:lstStyle/>
+          <a:p>
+            <a:pPr algn="ctr"/>
+            <a:endParaRPr lang="en-US" dirty="0"/>
+          </a:p>
+        </p:txBody>
+      </p:sp>
+      <p:sp>
+        <p:nvSpPr>
+          <p:cNvPr id="7" name="TextBox 6">
+            <a:extLst>
+              <a:ext uri="{FF2B5EF4-FFF2-40B4-BE49-F238E27FC236}">
+                <a16:creationId xmlns:a16="http://schemas.microsoft.com/office/drawing/2014/main" id="{4A394006-56A4-D748-8C94-B7536A9646FA}"/>
+              </a:ext>
+            </a:extLst>
+          </p:cNvPr>
+          <p:cNvSpPr txBox="1"/>
+          <p:nvPr/>
+        </p:nvSpPr>
+        <p:spPr>
+          <a:xfrm>
+            <a:off x="223140" y="489707"/>
+            <a:ext cx="1833194" cy="646331"/>
+          </a:xfrm>
+          <a:prstGeom prst="rect">
+            <a:avLst/>
+          </a:prstGeom>
+          <a:noFill/>
+          <a:ln>
+            <a:noFill/>
+          </a:ln>
+        </p:spPr>
+        <p:txBody>
+          <a:bodyPr wrap="none" rtlCol="0">
+            <a:spAutoFit/>
+          </a:bodyPr>
+          <a:lstStyle/>
+          <a:p>
+            <a:pPr algn="ctr"/>
+            <a:r>
+              <a:rPr lang="en-US" b="1" dirty="0">
+                <a:solidFill>
+                  <a:schemeClr val="bg1"/>
+                </a:solidFill>
+              </a:rPr>
+              <a:t>DATA </a:t>
+            </a:r>
+          </a:p>
+          <a:p>
+            <a:pPr algn="ctr"/>
+            <a:r>
+              <a:rPr lang="en-US" b="1" dirty="0">
+                <a:solidFill>
+                  <a:schemeClr val="bg1"/>
+                </a:solidFill>
+              </a:rPr>
+              <a:t>PRE-PROCESSING</a:t>
+            </a:r>
+          </a:p>
+        </p:txBody>
+      </p:sp>
+      <p:sp>
+        <p:nvSpPr>
+          <p:cNvPr id="8" name="TextBox 7">
+            <a:extLst>
+              <a:ext uri="{FF2B5EF4-FFF2-40B4-BE49-F238E27FC236}">
+                <a16:creationId xmlns:a16="http://schemas.microsoft.com/office/drawing/2014/main" id="{9B8D86B2-484C-6D49-A328-F1EDAFBC02B8}"/>
+              </a:ext>
+            </a:extLst>
+          </p:cNvPr>
+          <p:cNvSpPr txBox="1"/>
+          <p:nvPr/>
+        </p:nvSpPr>
+        <p:spPr>
+          <a:xfrm>
+            <a:off x="2433243" y="489708"/>
+            <a:ext cx="1716047" cy="646331"/>
+          </a:xfrm>
+          <a:prstGeom prst="rect">
+            <a:avLst/>
+          </a:prstGeom>
+          <a:noFill/>
+        </p:spPr>
+        <p:txBody>
+          <a:bodyPr wrap="none" rtlCol="0">
+            <a:spAutoFit/>
+          </a:bodyPr>
+          <a:lstStyle/>
+          <a:p>
+            <a:pPr algn="ctr"/>
+            <a:r>
+              <a:rPr lang="en-US" b="1" dirty="0">
+                <a:solidFill>
+                  <a:schemeClr val="bg1"/>
+                </a:solidFill>
+              </a:rPr>
+              <a:t>BAYESIAN </a:t>
+            </a:r>
+          </a:p>
+          <a:p>
+            <a:pPr algn="ctr"/>
+            <a:r>
+              <a:rPr lang="en-US" b="1" dirty="0">
+                <a:solidFill>
+                  <a:schemeClr val="bg1"/>
+                </a:solidFill>
+              </a:rPr>
+              <a:t>SEGMENTATION</a:t>
+            </a:r>
+          </a:p>
+        </p:txBody>
+      </p:sp>
+      <p:sp>
+        <p:nvSpPr>
+          <p:cNvPr id="9" name="TextBox 8">
+            <a:extLst>
+              <a:ext uri="{FF2B5EF4-FFF2-40B4-BE49-F238E27FC236}">
+                <a16:creationId xmlns:a16="http://schemas.microsoft.com/office/drawing/2014/main" id="{1C26AC00-EA53-F643-9928-249BE135CEE3}"/>
+              </a:ext>
+            </a:extLst>
+          </p:cNvPr>
+          <p:cNvSpPr txBox="1"/>
+          <p:nvPr/>
+        </p:nvSpPr>
+        <p:spPr>
+          <a:xfrm>
+            <a:off x="4488611" y="489707"/>
+            <a:ext cx="1995546" cy="646331"/>
+          </a:xfrm>
+          <a:prstGeom prst="rect">
+            <a:avLst/>
+          </a:prstGeom>
+          <a:noFill/>
+        </p:spPr>
+        <p:txBody>
+          <a:bodyPr wrap="none" rtlCol="0">
+            <a:spAutoFit/>
+          </a:bodyPr>
+          <a:lstStyle/>
+          <a:p>
+            <a:pPr algn="ctr"/>
+            <a:r>
+              <a:rPr lang="en-US" b="1" dirty="0">
+                <a:solidFill>
+                  <a:schemeClr val="accent6"/>
+                </a:solidFill>
+              </a:rPr>
+              <a:t>AUTOMATED </a:t>
+            </a:r>
+          </a:p>
+          <a:p>
+            <a:pPr algn="ctr"/>
+            <a:r>
+              <a:rPr lang="en-US" b="1" dirty="0">
+                <a:solidFill>
+                  <a:schemeClr val="accent6"/>
+                </a:solidFill>
+              </a:rPr>
+              <a:t>QUALITY CONTROL</a:t>
+            </a:r>
+          </a:p>
+        </p:txBody>
+      </p:sp>
+      <p:sp>
+        <p:nvSpPr>
+          <p:cNvPr id="10" name="TextBox 9">
+            <a:extLst>
+              <a:ext uri="{FF2B5EF4-FFF2-40B4-BE49-F238E27FC236}">
+                <a16:creationId xmlns:a16="http://schemas.microsoft.com/office/drawing/2014/main" id="{3FCCF23E-4D35-A342-87E3-3E5FE5F5A694}"/>
+              </a:ext>
+            </a:extLst>
+          </p:cNvPr>
+          <p:cNvSpPr txBox="1"/>
+          <p:nvPr/>
+        </p:nvSpPr>
+        <p:spPr>
+          <a:xfrm>
+            <a:off x="6729637" y="628206"/>
+            <a:ext cx="1643399" cy="369332"/>
+          </a:xfrm>
+          <a:prstGeom prst="rect">
+            <a:avLst/>
+          </a:prstGeom>
+          <a:noFill/>
+        </p:spPr>
+        <p:txBody>
+          <a:bodyPr wrap="none" rtlCol="0">
+            <a:spAutoFit/>
+          </a:bodyPr>
+          <a:lstStyle/>
+          <a:p>
+            <a:r>
+              <a:rPr lang="en-US" b="1" dirty="0">
+                <a:solidFill>
+                  <a:schemeClr val="bg1"/>
+                </a:solidFill>
+              </a:rPr>
+              <a:t>POST-ANALYSIS</a:t>
+            </a:r>
+          </a:p>
+        </p:txBody>
+      </p:sp>
+      <p:grpSp>
+        <p:nvGrpSpPr>
+          <p:cNvPr id="12" name="Group 11">
+            <a:extLst>
+              <a:ext uri="{FF2B5EF4-FFF2-40B4-BE49-F238E27FC236}">
+                <a16:creationId xmlns:a16="http://schemas.microsoft.com/office/drawing/2014/main" id="{B2B1C145-29FC-754A-A05D-34EA0A5BFB31}"/>
+              </a:ext>
+            </a:extLst>
+          </p:cNvPr>
+          <p:cNvGrpSpPr/>
+          <p:nvPr/>
+        </p:nvGrpSpPr>
+        <p:grpSpPr>
+          <a:xfrm>
+            <a:off x="492716" y="2892419"/>
+            <a:ext cx="1038841" cy="1125872"/>
+            <a:chOff x="142462" y="2112271"/>
+            <a:chExt cx="1861114" cy="1861117"/>
+          </a:xfrm>
+        </p:grpSpPr>
+        <p:sp>
+          <p:nvSpPr>
+            <p:cNvPr id="37" name="Rounded Rectangle 36">
+              <a:extLst>
+                <a:ext uri="{FF2B5EF4-FFF2-40B4-BE49-F238E27FC236}">
+                  <a16:creationId xmlns:a16="http://schemas.microsoft.com/office/drawing/2014/main" id="{8A42FC97-9F54-0C48-8592-A2012D814125}"/>
+                </a:ext>
+              </a:extLst>
+            </p:cNvPr>
+            <p:cNvSpPr/>
+            <p:nvPr/>
+          </p:nvSpPr>
+          <p:spPr>
+            <a:xfrm>
+              <a:off x="142462" y="2112271"/>
+              <a:ext cx="1403914" cy="1403915"/>
+            </a:xfrm>
+            <a:prstGeom prst="roundRect">
+              <a:avLst>
+                <a:gd name="adj" fmla="val 10000"/>
+              </a:avLst>
+            </a:prstGeom>
+            <a:blipFill rotWithShape="1">
+              <a:blip r:embed="rId7">
+                <a:extLst>
+                  <a:ext uri="{28A0092B-C50C-407E-A947-70E740481C1C}">
+                    <a14:useLocalDpi xmlns:a14="http://schemas.microsoft.com/office/drawing/2010/main" val="0"/>
+                  </a:ext>
+                </a:extLst>
+              </a:blip>
+              <a:srcRect/>
+              <a:stretch>
+                <a:fillRect t="-38000" b="-38000"/>
+              </a:stretch>
+            </a:blipFill>
+          </p:spPr>
+          <p:style>
+            <a:lnRef idx="1">
+              <a:schemeClr val="lt1">
+                <a:hueOff val="0"/>
+                <a:satOff val="0"/>
+                <a:lumOff val="0"/>
+                <a:alphaOff val="0"/>
+              </a:schemeClr>
+            </a:lnRef>
+            <a:fillRef idx="1">
+              <a:scrgbClr r="0" g="0" b="0"/>
+            </a:fillRef>
+            <a:effectRef idx="1">
+              <a:schemeClr val="accent5">
+                <a:tint val="50000"/>
+                <a:hueOff val="0"/>
+                <a:satOff val="0"/>
+                <a:lumOff val="0"/>
+                <a:alphaOff val="0"/>
+              </a:schemeClr>
+            </a:effectRef>
+            <a:fontRef idx="minor">
+              <a:schemeClr val="lt1">
+                <a:hueOff val="0"/>
+                <a:satOff val="0"/>
+                <a:lumOff val="0"/>
+                <a:alphaOff val="0"/>
+              </a:schemeClr>
+            </a:fontRef>
+          </p:style>
+        </p:sp>
+        <p:sp>
+          <p:nvSpPr>
+            <p:cNvPr id="38" name="Rounded Rectangle 37">
+              <a:extLst>
+                <a:ext uri="{FF2B5EF4-FFF2-40B4-BE49-F238E27FC236}">
+                  <a16:creationId xmlns:a16="http://schemas.microsoft.com/office/drawing/2014/main" id="{8275DF99-52AC-3A4D-8F04-856B76FB3B16}"/>
+                </a:ext>
+              </a:extLst>
+            </p:cNvPr>
+            <p:cNvSpPr/>
+            <p:nvPr/>
+          </p:nvSpPr>
+          <p:spPr>
+            <a:xfrm>
+              <a:off x="294862" y="2264670"/>
+              <a:ext cx="1403914" cy="1403913"/>
+            </a:xfrm>
+            <a:prstGeom prst="roundRect">
+              <a:avLst>
+                <a:gd name="adj" fmla="val 10000"/>
+              </a:avLst>
+            </a:prstGeom>
+            <a:blipFill rotWithShape="1">
+              <a:blip r:embed="rId7">
+                <a:extLst>
+                  <a:ext uri="{28A0092B-C50C-407E-A947-70E740481C1C}">
+                    <a14:useLocalDpi xmlns:a14="http://schemas.microsoft.com/office/drawing/2010/main" val="0"/>
+                  </a:ext>
+                </a:extLst>
+              </a:blip>
+              <a:srcRect/>
+              <a:stretch>
+                <a:fillRect t="-38000" b="-38000"/>
+              </a:stretch>
+            </a:blipFill>
+          </p:spPr>
+          <p:style>
+            <a:lnRef idx="1">
+              <a:schemeClr val="lt1">
+                <a:hueOff val="0"/>
+                <a:satOff val="0"/>
+                <a:lumOff val="0"/>
+                <a:alphaOff val="0"/>
+              </a:schemeClr>
+            </a:lnRef>
+            <a:fillRef idx="1">
+              <a:scrgbClr r="0" g="0" b="0"/>
+            </a:fillRef>
+            <a:effectRef idx="1">
+              <a:schemeClr val="accent5">
+                <a:tint val="50000"/>
+                <a:hueOff val="0"/>
+                <a:satOff val="0"/>
+                <a:lumOff val="0"/>
+                <a:alphaOff val="0"/>
+              </a:schemeClr>
+            </a:effectRef>
+            <a:fontRef idx="minor">
+              <a:schemeClr val="lt1">
+                <a:hueOff val="0"/>
+                <a:satOff val="0"/>
+                <a:lumOff val="0"/>
+                <a:alphaOff val="0"/>
+              </a:schemeClr>
+            </a:fontRef>
+          </p:style>
+        </p:sp>
+        <p:sp>
+          <p:nvSpPr>
+            <p:cNvPr id="39" name="Rounded Rectangle 38">
+              <a:extLst>
+                <a:ext uri="{FF2B5EF4-FFF2-40B4-BE49-F238E27FC236}">
+                  <a16:creationId xmlns:a16="http://schemas.microsoft.com/office/drawing/2014/main" id="{3F8585D2-A63F-8747-8CA2-0E51BAD53C9A}"/>
+                </a:ext>
+              </a:extLst>
+            </p:cNvPr>
+            <p:cNvSpPr/>
+            <p:nvPr/>
+          </p:nvSpPr>
+          <p:spPr>
+            <a:xfrm>
+              <a:off x="447262" y="2417073"/>
+              <a:ext cx="1403914" cy="1403914"/>
+            </a:xfrm>
+            <a:prstGeom prst="roundRect">
+              <a:avLst>
+                <a:gd name="adj" fmla="val 10000"/>
+              </a:avLst>
+            </a:prstGeom>
+            <a:blipFill rotWithShape="1">
+              <a:blip r:embed="rId7">
+                <a:extLst>
+                  <a:ext uri="{28A0092B-C50C-407E-A947-70E740481C1C}">
+                    <a14:useLocalDpi xmlns:a14="http://schemas.microsoft.com/office/drawing/2010/main" val="0"/>
+                  </a:ext>
+                </a:extLst>
+              </a:blip>
+              <a:srcRect/>
+              <a:stretch>
+                <a:fillRect t="-38000" b="-38000"/>
+              </a:stretch>
+            </a:blipFill>
+          </p:spPr>
+          <p:style>
+            <a:lnRef idx="1">
+              <a:schemeClr val="lt1">
+                <a:hueOff val="0"/>
+                <a:satOff val="0"/>
+                <a:lumOff val="0"/>
+                <a:alphaOff val="0"/>
+              </a:schemeClr>
+            </a:lnRef>
+            <a:fillRef idx="1">
+              <a:scrgbClr r="0" g="0" b="0"/>
+            </a:fillRef>
+            <a:effectRef idx="1">
+              <a:schemeClr val="accent5">
+                <a:tint val="50000"/>
+                <a:hueOff val="0"/>
+                <a:satOff val="0"/>
+                <a:lumOff val="0"/>
+                <a:alphaOff val="0"/>
+              </a:schemeClr>
+            </a:effectRef>
+            <a:fontRef idx="minor">
+              <a:schemeClr val="lt1">
+                <a:hueOff val="0"/>
+                <a:satOff val="0"/>
+                <a:lumOff val="0"/>
+                <a:alphaOff val="0"/>
+              </a:schemeClr>
+            </a:fontRef>
+          </p:style>
+        </p:sp>
+        <p:sp>
+          <p:nvSpPr>
+            <p:cNvPr id="40" name="Rounded Rectangle 39">
+              <a:extLst>
+                <a:ext uri="{FF2B5EF4-FFF2-40B4-BE49-F238E27FC236}">
+                  <a16:creationId xmlns:a16="http://schemas.microsoft.com/office/drawing/2014/main" id="{0912ABD7-5BE5-5F46-97A8-8BDF58EC0A8D}"/>
+                </a:ext>
+              </a:extLst>
+            </p:cNvPr>
+            <p:cNvSpPr/>
+            <p:nvPr/>
+          </p:nvSpPr>
+          <p:spPr>
+            <a:xfrm>
+              <a:off x="599662" y="2569474"/>
+              <a:ext cx="1403914" cy="1403914"/>
+            </a:xfrm>
+            <a:prstGeom prst="roundRect">
+              <a:avLst>
+                <a:gd name="adj" fmla="val 10000"/>
+              </a:avLst>
+            </a:prstGeom>
+            <a:blipFill rotWithShape="1">
+              <a:blip r:embed="rId7">
+                <a:extLst>
+                  <a:ext uri="{28A0092B-C50C-407E-A947-70E740481C1C}">
+                    <a14:useLocalDpi xmlns:a14="http://schemas.microsoft.com/office/drawing/2010/main" val="0"/>
+                  </a:ext>
+                </a:extLst>
+              </a:blip>
+              <a:srcRect/>
+              <a:stretch>
+                <a:fillRect t="-38000" b="-38000"/>
+              </a:stretch>
+            </a:blipFill>
+          </p:spPr>
+          <p:style>
+            <a:lnRef idx="1">
+              <a:schemeClr val="lt1">
+                <a:hueOff val="0"/>
+                <a:satOff val="0"/>
+                <a:lumOff val="0"/>
+                <a:alphaOff val="0"/>
+              </a:schemeClr>
+            </a:lnRef>
+            <a:fillRef idx="1">
+              <a:scrgbClr r="0" g="0" b="0"/>
+            </a:fillRef>
+            <a:effectRef idx="1">
+              <a:schemeClr val="accent5">
+                <a:tint val="50000"/>
+                <a:hueOff val="0"/>
+                <a:satOff val="0"/>
+                <a:lumOff val="0"/>
+                <a:alphaOff val="0"/>
+              </a:schemeClr>
+            </a:effectRef>
+            <a:fontRef idx="minor">
+              <a:schemeClr val="lt1">
+                <a:hueOff val="0"/>
+                <a:satOff val="0"/>
+                <a:lumOff val="0"/>
+                <a:alphaOff val="0"/>
+              </a:schemeClr>
+            </a:fontRef>
+          </p:style>
+        </p:sp>
+      </p:grpSp>
+      <p:sp>
+        <p:nvSpPr>
+          <p:cNvPr id="17" name="Alternate Process 16">
+            <a:extLst>
+              <a:ext uri="{FF2B5EF4-FFF2-40B4-BE49-F238E27FC236}">
+                <a16:creationId xmlns:a16="http://schemas.microsoft.com/office/drawing/2014/main" id="{3B98FC88-1946-D146-886B-59D854F6FA4E}"/>
+              </a:ext>
+            </a:extLst>
+          </p:cNvPr>
+          <p:cNvSpPr/>
+          <p:nvPr/>
+        </p:nvSpPr>
+        <p:spPr>
+          <a:xfrm>
+            <a:off x="6671791" y="2652560"/>
+            <a:ext cx="1798313" cy="490936"/>
+          </a:xfrm>
+          <a:prstGeom prst="flowChartAlternateProcess">
+            <a:avLst/>
+          </a:prstGeom>
+          <a:solidFill>
+            <a:schemeClr val="accent5">
+              <a:alpha val="20000"/>
+            </a:schemeClr>
+          </a:solidFill>
+          <a:ln>
+            <a:solidFill>
+              <a:srgbClr val="1F3864"/>
+            </a:solidFill>
+          </a:ln>
+        </p:spPr>
+        <p:style>
+          <a:lnRef idx="2">
+            <a:schemeClr val="accent1">
+              <a:shade val="50000"/>
+            </a:schemeClr>
+          </a:lnRef>
+          <a:fillRef idx="1">
+            <a:schemeClr val="accent1"/>
+          </a:fillRef>
+          <a:effectRef idx="0">
+            <a:schemeClr val="accent1"/>
+          </a:effectRef>
+          <a:fontRef idx="minor">
+            <a:schemeClr val="lt1"/>
+          </a:fontRef>
+        </p:style>
+        <p:txBody>
+          <a:bodyPr rtlCol="0" anchor="ctr"/>
+          <a:lstStyle/>
+          <a:p>
+            <a:pPr algn="ctr"/>
+            <a:endParaRPr lang="en-US" dirty="0"/>
+          </a:p>
+        </p:txBody>
+      </p:sp>
+      <p:sp>
+        <p:nvSpPr>
+          <p:cNvPr id="18" name="Alternate Process 17">
+            <a:extLst>
+              <a:ext uri="{FF2B5EF4-FFF2-40B4-BE49-F238E27FC236}">
+                <a16:creationId xmlns:a16="http://schemas.microsoft.com/office/drawing/2014/main" id="{9131C350-9CB6-8C4C-BC82-B015858862FA}"/>
+              </a:ext>
+            </a:extLst>
+          </p:cNvPr>
+          <p:cNvSpPr/>
+          <p:nvPr/>
+        </p:nvSpPr>
+        <p:spPr>
+          <a:xfrm>
+            <a:off x="6671791" y="3420025"/>
+            <a:ext cx="1798313" cy="708848"/>
+          </a:xfrm>
+          <a:prstGeom prst="flowChartAlternateProcess">
+            <a:avLst/>
+          </a:prstGeom>
+          <a:solidFill>
+            <a:schemeClr val="accent5">
+              <a:alpha val="20000"/>
+            </a:schemeClr>
+          </a:solidFill>
+          <a:ln>
+            <a:solidFill>
+              <a:srgbClr val="1F3864"/>
+            </a:solidFill>
+          </a:ln>
+        </p:spPr>
+        <p:style>
+          <a:lnRef idx="2">
+            <a:schemeClr val="accent1">
+              <a:shade val="50000"/>
+            </a:schemeClr>
+          </a:lnRef>
+          <a:fillRef idx="1">
+            <a:schemeClr val="accent1"/>
+          </a:fillRef>
+          <a:effectRef idx="0">
+            <a:schemeClr val="accent1"/>
+          </a:effectRef>
+          <a:fontRef idx="minor">
+            <a:schemeClr val="lt1"/>
+          </a:fontRef>
+        </p:style>
+        <p:txBody>
+          <a:bodyPr rtlCol="0" anchor="ctr"/>
+          <a:lstStyle/>
+          <a:p>
+            <a:pPr algn="ctr"/>
+            <a:endParaRPr lang="en-US" dirty="0"/>
+          </a:p>
+        </p:txBody>
+      </p:sp>
+      <p:sp>
+        <p:nvSpPr>
+          <p:cNvPr id="14" name="Rectangle 13">
+            <a:extLst>
+              <a:ext uri="{FF2B5EF4-FFF2-40B4-BE49-F238E27FC236}">
+                <a16:creationId xmlns:a16="http://schemas.microsoft.com/office/drawing/2014/main" id="{3F770A64-E15B-2D48-9A67-5F53E6A32147}"/>
+              </a:ext>
+            </a:extLst>
+          </p:cNvPr>
+          <p:cNvSpPr/>
+          <p:nvPr/>
+        </p:nvSpPr>
+        <p:spPr>
+          <a:xfrm>
+            <a:off x="6493331" y="2415141"/>
+            <a:ext cx="2199065" cy="2459272"/>
+          </a:xfrm>
+          <a:prstGeom prst="rect">
+            <a:avLst/>
+          </a:prstGeom>
+          <a:solidFill>
+            <a:schemeClr val="tx1">
+              <a:lumMod val="90000"/>
+              <a:alpha val="30000"/>
+            </a:schemeClr>
+          </a:solidFill>
+          <a:ln w="25400">
+            <a:noFill/>
+          </a:ln>
+        </p:spPr>
+        <p:style>
+          <a:lnRef idx="2">
+            <a:schemeClr val="accent1">
+              <a:shade val="50000"/>
+            </a:schemeClr>
+          </a:lnRef>
+          <a:fillRef idx="1">
+            <a:schemeClr val="accent1"/>
+          </a:fillRef>
+          <a:effectRef idx="0">
+            <a:schemeClr val="accent1"/>
+          </a:effectRef>
+          <a:fontRef idx="minor">
+            <a:schemeClr val="lt1"/>
+          </a:fontRef>
+        </p:style>
+        <p:txBody>
+          <a:bodyPr rtlCol="0" anchor="ctr"/>
+          <a:lstStyle/>
+          <a:p>
+            <a:pPr algn="ctr"/>
+            <a:endParaRPr lang="en-US" dirty="0"/>
+          </a:p>
+        </p:txBody>
+      </p:sp>
+      <p:sp>
+        <p:nvSpPr>
+          <p:cNvPr id="19" name="TextBox 18">
+            <a:extLst>
+              <a:ext uri="{FF2B5EF4-FFF2-40B4-BE49-F238E27FC236}">
+                <a16:creationId xmlns:a16="http://schemas.microsoft.com/office/drawing/2014/main" id="{02D1FD99-B8D9-1B4E-928F-FC312FD26673}"/>
+              </a:ext>
+            </a:extLst>
+          </p:cNvPr>
+          <p:cNvSpPr txBox="1"/>
+          <p:nvPr/>
+        </p:nvSpPr>
+        <p:spPr>
+          <a:xfrm rot="5400000">
+            <a:off x="7407815" y="4006810"/>
+            <a:ext cx="708848" cy="923330"/>
+          </a:xfrm>
+          <a:prstGeom prst="rect">
+            <a:avLst/>
+          </a:prstGeom>
+          <a:noFill/>
+        </p:spPr>
+        <p:txBody>
+          <a:bodyPr wrap="none" rtlCol="0">
+            <a:spAutoFit/>
+          </a:bodyPr>
+          <a:lstStyle/>
+          <a:p>
+            <a:r>
+              <a:rPr lang="en-US" sz="5400" dirty="0">
+                <a:solidFill>
+                  <a:schemeClr val="bg1"/>
+                </a:solidFill>
+              </a:rPr>
+              <a:t>...</a:t>
+            </a:r>
+          </a:p>
+        </p:txBody>
+      </p:sp>
+      <p:sp>
+        <p:nvSpPr>
+          <p:cNvPr id="15" name="TextBox 14">
+            <a:extLst>
+              <a:ext uri="{FF2B5EF4-FFF2-40B4-BE49-F238E27FC236}">
+                <a16:creationId xmlns:a16="http://schemas.microsoft.com/office/drawing/2014/main" id="{C243B69A-C618-EF4A-80E7-DBA72240F757}"/>
+              </a:ext>
+            </a:extLst>
+          </p:cNvPr>
+          <p:cNvSpPr txBox="1"/>
+          <p:nvPr/>
+        </p:nvSpPr>
+        <p:spPr>
+          <a:xfrm>
+            <a:off x="6664185" y="2735696"/>
+            <a:ext cx="1798313" cy="369332"/>
+          </a:xfrm>
+          <a:prstGeom prst="rect">
+            <a:avLst/>
+          </a:prstGeom>
+          <a:noFill/>
+        </p:spPr>
+        <p:txBody>
+          <a:bodyPr wrap="none" rtlCol="0">
+            <a:spAutoFit/>
+          </a:bodyPr>
+          <a:lstStyle/>
+          <a:p>
+            <a:r>
+              <a:rPr lang="en-US" dirty="0">
+                <a:solidFill>
+                  <a:schemeClr val="bg1"/>
+                </a:solidFill>
+              </a:rPr>
+              <a:t>GROUP ANALYSIS</a:t>
+            </a:r>
+          </a:p>
+        </p:txBody>
+      </p:sp>
+      <p:sp>
+        <p:nvSpPr>
+          <p:cNvPr id="16" name="TextBox 15">
+            <a:extLst>
+              <a:ext uri="{FF2B5EF4-FFF2-40B4-BE49-F238E27FC236}">
+                <a16:creationId xmlns:a16="http://schemas.microsoft.com/office/drawing/2014/main" id="{FA8FDA63-533C-3B46-8AAC-B1A068C3D5F9}"/>
+              </a:ext>
+            </a:extLst>
+          </p:cNvPr>
+          <p:cNvSpPr txBox="1"/>
+          <p:nvPr/>
+        </p:nvSpPr>
+        <p:spPr>
+          <a:xfrm>
+            <a:off x="6652181" y="3433904"/>
+            <a:ext cx="1798313" cy="646331"/>
+          </a:xfrm>
+          <a:prstGeom prst="rect">
+            <a:avLst/>
+          </a:prstGeom>
+          <a:noFill/>
+        </p:spPr>
+        <p:txBody>
+          <a:bodyPr wrap="square" rtlCol="0">
+            <a:spAutoFit/>
+          </a:bodyPr>
+          <a:lstStyle/>
+          <a:p>
+            <a:pPr algn="ctr"/>
+            <a:r>
+              <a:rPr lang="en-US" dirty="0">
+                <a:solidFill>
+                  <a:schemeClr val="bg1"/>
+                </a:solidFill>
+              </a:rPr>
+              <a:t>DISEASE </a:t>
+            </a:r>
+          </a:p>
+          <a:p>
+            <a:pPr algn="ctr"/>
+            <a:r>
+              <a:rPr lang="en-US" dirty="0">
+                <a:solidFill>
+                  <a:schemeClr val="bg1"/>
+                </a:solidFill>
+              </a:rPr>
+              <a:t>CLASSIFICATION</a:t>
+            </a:r>
+          </a:p>
+        </p:txBody>
+      </p:sp>
+      <p:sp>
+        <p:nvSpPr>
+          <p:cNvPr id="20" name="Right Arrow 19">
+            <a:extLst>
+              <a:ext uri="{FF2B5EF4-FFF2-40B4-BE49-F238E27FC236}">
+                <a16:creationId xmlns:a16="http://schemas.microsoft.com/office/drawing/2014/main" id="{2A0E1A22-D347-BB43-A411-F49B0E606CE8}"/>
+              </a:ext>
+            </a:extLst>
+          </p:cNvPr>
+          <p:cNvSpPr/>
+          <p:nvPr/>
+        </p:nvSpPr>
+        <p:spPr>
+          <a:xfrm>
+            <a:off x="1623884" y="3377646"/>
+            <a:ext cx="720000" cy="432000"/>
+          </a:xfrm>
+          <a:prstGeom prst="rightArrow">
+            <a:avLst/>
+          </a:prstGeom>
+          <a:solidFill>
+            <a:srgbClr val="00B0F0">
+              <a:alpha val="70000"/>
+            </a:srgbClr>
+          </a:solidFill>
+          <a:ln>
+            <a:noFill/>
+          </a:ln>
+        </p:spPr>
+        <p:style>
+          <a:lnRef idx="2">
+            <a:schemeClr val="accent1">
+              <a:shade val="50000"/>
+            </a:schemeClr>
+          </a:lnRef>
+          <a:fillRef idx="1">
+            <a:schemeClr val="accent1"/>
+          </a:fillRef>
+          <a:effectRef idx="0">
+            <a:schemeClr val="accent1"/>
+          </a:effectRef>
+          <a:fontRef idx="minor">
+            <a:schemeClr val="lt1"/>
+          </a:fontRef>
+        </p:style>
+        <p:txBody>
+          <a:bodyPr rtlCol="0" anchor="ctr"/>
+          <a:lstStyle/>
+          <a:p>
+            <a:pPr algn="ctr"/>
+            <a:endParaRPr lang="en-US"/>
+          </a:p>
+        </p:txBody>
+      </p:sp>
+      <p:grpSp>
+        <p:nvGrpSpPr>
+          <p:cNvPr id="54" name="Group 53">
+            <a:extLst>
+              <a:ext uri="{FF2B5EF4-FFF2-40B4-BE49-F238E27FC236}">
+                <a16:creationId xmlns:a16="http://schemas.microsoft.com/office/drawing/2014/main" id="{B31F52DB-73C2-CF49-81BA-F49A308C2823}"/>
+              </a:ext>
+            </a:extLst>
+          </p:cNvPr>
+          <p:cNvGrpSpPr/>
+          <p:nvPr/>
+        </p:nvGrpSpPr>
+        <p:grpSpPr>
+          <a:xfrm>
+            <a:off x="5537359" y="2927398"/>
+            <a:ext cx="900001" cy="1204421"/>
+            <a:chOff x="5559123" y="2266464"/>
+            <a:chExt cx="900001" cy="1204421"/>
+          </a:xfrm>
+        </p:grpSpPr>
+        <p:sp>
+          <p:nvSpPr>
+            <p:cNvPr id="23" name="Right Arrow 22">
+              <a:extLst>
+                <a:ext uri="{FF2B5EF4-FFF2-40B4-BE49-F238E27FC236}">
+                  <a16:creationId xmlns:a16="http://schemas.microsoft.com/office/drawing/2014/main" id="{800C428C-FDDA-C94A-9215-FE18C88A904B}"/>
+                </a:ext>
+              </a:extLst>
+            </p:cNvPr>
+            <p:cNvSpPr/>
+            <p:nvPr/>
+          </p:nvSpPr>
+          <p:spPr>
+            <a:xfrm>
+              <a:off x="5559123" y="2839431"/>
+              <a:ext cx="900000" cy="177052"/>
+            </a:xfrm>
+            <a:prstGeom prst="rightArrow">
+              <a:avLst/>
+            </a:prstGeom>
+            <a:gradFill>
+              <a:gsLst>
+                <a:gs pos="0">
+                  <a:schemeClr val="accent6">
+                    <a:lumMod val="0"/>
+                  </a:schemeClr>
+                </a:gs>
+                <a:gs pos="0">
+                  <a:schemeClr val="accent6">
+                    <a:lumMod val="60000"/>
+                    <a:lumOff val="40000"/>
+                  </a:schemeClr>
+                </a:gs>
+                <a:gs pos="90000">
+                  <a:schemeClr val="tx1">
+                    <a:lumMod val="90000"/>
+                  </a:schemeClr>
+                </a:gs>
+                <a:gs pos="100000">
+                  <a:schemeClr val="tx1">
+                    <a:lumMod val="50000"/>
+                  </a:schemeClr>
+                </a:gs>
+              </a:gsLst>
+              <a:lin ang="5400000" scaled="1"/>
+            </a:gradFill>
+            <a:ln>
+              <a:gradFill>
+                <a:gsLst>
+                  <a:gs pos="0">
+                    <a:schemeClr val="accent1">
+                      <a:lumMod val="5000"/>
+                      <a:lumOff val="95000"/>
+                    </a:schemeClr>
+                  </a:gs>
+                  <a:gs pos="74000">
+                    <a:schemeClr val="accent1">
+                      <a:lumMod val="45000"/>
+                      <a:lumOff val="55000"/>
+                    </a:schemeClr>
+                  </a:gs>
+                  <a:gs pos="83000">
+                    <a:schemeClr val="accent1">
+                      <a:lumMod val="45000"/>
+                      <a:lumOff val="55000"/>
+                    </a:schemeClr>
+                  </a:gs>
+                  <a:gs pos="100000">
+                    <a:schemeClr val="accent1">
+                      <a:lumMod val="30000"/>
+                      <a:lumOff val="70000"/>
+                    </a:schemeClr>
+                  </a:gs>
+                </a:gsLst>
+                <a:lin ang="5400000" scaled="1"/>
+              </a:gradFill>
+            </a:ln>
+          </p:spPr>
+          <p:style>
+            <a:lnRef idx="2">
+              <a:schemeClr val="accent1">
+                <a:shade val="50000"/>
+              </a:schemeClr>
+            </a:lnRef>
+            <a:fillRef idx="1">
+              <a:schemeClr val="accent1"/>
+            </a:fillRef>
+            <a:effectRef idx="0">
+              <a:schemeClr val="accent1"/>
+            </a:effectRef>
+            <a:fontRef idx="minor">
+              <a:schemeClr val="lt1"/>
+            </a:fontRef>
+          </p:style>
+          <p:txBody>
+            <a:bodyPr rtlCol="0" anchor="ctr"/>
+            <a:lstStyle/>
+            <a:p>
+              <a:pPr algn="ctr"/>
+              <a:endParaRPr lang="en-US"/>
+            </a:p>
+          </p:txBody>
+        </p:sp>
+        <p:sp>
+          <p:nvSpPr>
+            <p:cNvPr id="24" name="Right Arrow 23">
+              <a:extLst>
+                <a:ext uri="{FF2B5EF4-FFF2-40B4-BE49-F238E27FC236}">
+                  <a16:creationId xmlns:a16="http://schemas.microsoft.com/office/drawing/2014/main" id="{0E35AF7B-1C88-694A-8773-ABE86E2C6530}"/>
+                </a:ext>
+              </a:extLst>
+            </p:cNvPr>
+            <p:cNvSpPr/>
+            <p:nvPr/>
+          </p:nvSpPr>
+          <p:spPr>
+            <a:xfrm>
+              <a:off x="5559124" y="3187602"/>
+              <a:ext cx="900000" cy="283283"/>
+            </a:xfrm>
+            <a:prstGeom prst="rightArrow">
+              <a:avLst/>
+            </a:prstGeom>
+            <a:gradFill>
+              <a:gsLst>
+                <a:gs pos="0">
+                  <a:schemeClr val="accent6">
+                    <a:lumMod val="0"/>
+                  </a:schemeClr>
+                </a:gs>
+                <a:gs pos="0">
+                  <a:schemeClr val="accent6">
+                    <a:lumMod val="60000"/>
+                    <a:lumOff val="40000"/>
+                  </a:schemeClr>
+                </a:gs>
+                <a:gs pos="50000">
+                  <a:schemeClr val="tx1">
+                    <a:lumMod val="90000"/>
+                  </a:schemeClr>
+                </a:gs>
+                <a:gs pos="100000">
+                  <a:schemeClr val="tx1">
+                    <a:lumMod val="50000"/>
+                  </a:schemeClr>
+                </a:gs>
+              </a:gsLst>
+              <a:lin ang="5400000" scaled="1"/>
+            </a:gradFill>
+            <a:ln>
+              <a:gradFill>
+                <a:gsLst>
+                  <a:gs pos="0">
+                    <a:schemeClr val="accent1">
+                      <a:lumMod val="5000"/>
+                      <a:lumOff val="95000"/>
+                    </a:schemeClr>
+                  </a:gs>
+                  <a:gs pos="74000">
+                    <a:schemeClr val="accent1">
+                      <a:lumMod val="45000"/>
+                      <a:lumOff val="55000"/>
+                    </a:schemeClr>
+                  </a:gs>
+                  <a:gs pos="83000">
+                    <a:schemeClr val="accent1">
+                      <a:lumMod val="45000"/>
+                      <a:lumOff val="55000"/>
+                    </a:schemeClr>
+                  </a:gs>
+                  <a:gs pos="100000">
+                    <a:schemeClr val="accent1">
+                      <a:lumMod val="30000"/>
+                      <a:lumOff val="70000"/>
+                    </a:schemeClr>
+                  </a:gs>
+                </a:gsLst>
+                <a:lin ang="5400000" scaled="1"/>
+              </a:gradFill>
+            </a:ln>
+          </p:spPr>
+          <p:style>
+            <a:lnRef idx="2">
+              <a:schemeClr val="accent1">
+                <a:shade val="50000"/>
+              </a:schemeClr>
+            </a:lnRef>
+            <a:fillRef idx="1">
+              <a:schemeClr val="accent1"/>
+            </a:fillRef>
+            <a:effectRef idx="0">
+              <a:schemeClr val="accent1"/>
+            </a:effectRef>
+            <a:fontRef idx="minor">
+              <a:schemeClr val="lt1"/>
+            </a:fontRef>
+          </p:style>
+          <p:txBody>
+            <a:bodyPr rtlCol="0" anchor="ctr"/>
+            <a:lstStyle/>
+            <a:p>
+              <a:pPr algn="ctr"/>
+              <a:endParaRPr lang="en-US"/>
+            </a:p>
+          </p:txBody>
+        </p:sp>
+        <p:sp>
+          <p:nvSpPr>
+            <p:cNvPr id="25" name="Right Arrow 24">
+              <a:extLst>
+                <a:ext uri="{FF2B5EF4-FFF2-40B4-BE49-F238E27FC236}">
+                  <a16:creationId xmlns:a16="http://schemas.microsoft.com/office/drawing/2014/main" id="{48D2A6FC-9116-6C46-8BC8-F6D721E2F926}"/>
+                </a:ext>
+              </a:extLst>
+            </p:cNvPr>
+            <p:cNvSpPr/>
+            <p:nvPr/>
+          </p:nvSpPr>
+          <p:spPr>
+            <a:xfrm>
+              <a:off x="5559123" y="2266464"/>
+              <a:ext cx="900000" cy="527957"/>
+            </a:xfrm>
+            <a:prstGeom prst="rightArrow">
+              <a:avLst/>
+            </a:prstGeom>
+            <a:gradFill>
+              <a:gsLst>
+                <a:gs pos="0">
+                  <a:schemeClr val="accent6">
+                    <a:lumMod val="0"/>
+                  </a:schemeClr>
+                </a:gs>
+                <a:gs pos="0">
+                  <a:schemeClr val="accent6">
+                    <a:lumMod val="60000"/>
+                    <a:lumOff val="40000"/>
+                  </a:schemeClr>
+                </a:gs>
+                <a:gs pos="10000">
+                  <a:schemeClr val="tx1">
+                    <a:lumMod val="90000"/>
+                  </a:schemeClr>
+                </a:gs>
+                <a:gs pos="100000">
+                  <a:schemeClr val="tx1">
+                    <a:lumMod val="50000"/>
+                  </a:schemeClr>
+                </a:gs>
+              </a:gsLst>
+              <a:lin ang="5400000" scaled="1"/>
+            </a:gradFill>
+            <a:ln>
+              <a:gradFill>
+                <a:gsLst>
+                  <a:gs pos="0">
+                    <a:schemeClr val="accent1">
+                      <a:lumMod val="5000"/>
+                      <a:lumOff val="95000"/>
+                    </a:schemeClr>
+                  </a:gs>
+                  <a:gs pos="74000">
+                    <a:schemeClr val="accent1">
+                      <a:lumMod val="45000"/>
+                      <a:lumOff val="55000"/>
+                    </a:schemeClr>
+                  </a:gs>
+                  <a:gs pos="83000">
+                    <a:schemeClr val="accent1">
+                      <a:lumMod val="45000"/>
+                      <a:lumOff val="55000"/>
+                    </a:schemeClr>
+                  </a:gs>
+                  <a:gs pos="100000">
+                    <a:schemeClr val="accent1">
+                      <a:lumMod val="30000"/>
+                      <a:lumOff val="70000"/>
+                    </a:schemeClr>
+                  </a:gs>
+                </a:gsLst>
+                <a:lin ang="5400000" scaled="1"/>
+              </a:gradFill>
+            </a:ln>
+          </p:spPr>
+          <p:style>
+            <a:lnRef idx="2">
+              <a:schemeClr val="accent1">
+                <a:shade val="50000"/>
+              </a:schemeClr>
+            </a:lnRef>
+            <a:fillRef idx="1">
+              <a:schemeClr val="accent1"/>
+            </a:fillRef>
+            <a:effectRef idx="0">
+              <a:schemeClr val="accent1"/>
+            </a:effectRef>
+            <a:fontRef idx="minor">
+              <a:schemeClr val="lt1"/>
+            </a:fontRef>
+          </p:style>
+          <p:txBody>
+            <a:bodyPr rtlCol="0" anchor="ctr"/>
+            <a:lstStyle/>
+            <a:p>
+              <a:pPr algn="ctr"/>
+              <a:endParaRPr lang="en-US" dirty="0"/>
+            </a:p>
+          </p:txBody>
+        </p:sp>
+      </p:grpSp>
+      <p:sp>
+        <p:nvSpPr>
+          <p:cNvPr id="41" name="TextBox 40">
+            <a:extLst>
+              <a:ext uri="{FF2B5EF4-FFF2-40B4-BE49-F238E27FC236}">
+                <a16:creationId xmlns:a16="http://schemas.microsoft.com/office/drawing/2014/main" id="{B7328278-2BBD-764B-B47D-C636C131DE2A}"/>
+              </a:ext>
+            </a:extLst>
+          </p:cNvPr>
+          <p:cNvSpPr txBox="1"/>
+          <p:nvPr/>
+        </p:nvSpPr>
+        <p:spPr>
+          <a:xfrm>
+            <a:off x="2561375" y="1156557"/>
+            <a:ext cx="1533753" cy="369332"/>
+          </a:xfrm>
+          <a:prstGeom prst="rect">
+            <a:avLst/>
+          </a:prstGeom>
+          <a:noFill/>
+        </p:spPr>
+        <p:txBody>
+          <a:bodyPr wrap="none" rtlCol="0">
+            <a:spAutoFit/>
+          </a:bodyPr>
+          <a:lstStyle/>
+          <a:p>
+            <a:r>
+              <a:rPr lang="en-US" b="1" dirty="0">
+                <a:solidFill>
+                  <a:schemeClr val="accent1"/>
+                </a:solidFill>
+              </a:rPr>
+              <a:t>MC DROPOUT</a:t>
+            </a:r>
+          </a:p>
+        </p:txBody>
+      </p:sp>
+      <p:sp>
+        <p:nvSpPr>
+          <p:cNvPr id="32" name="Rectangle 31">
+            <a:extLst>
+              <a:ext uri="{FF2B5EF4-FFF2-40B4-BE49-F238E27FC236}">
+                <a16:creationId xmlns:a16="http://schemas.microsoft.com/office/drawing/2014/main" id="{5F557C21-E8CE-6645-B310-CF6727B19242}"/>
+              </a:ext>
+            </a:extLst>
+          </p:cNvPr>
+          <p:cNvSpPr/>
+          <p:nvPr/>
+        </p:nvSpPr>
+        <p:spPr>
+          <a:xfrm>
+            <a:off x="2684518" y="2680383"/>
+            <a:ext cx="1278453" cy="830938"/>
+          </a:xfrm>
+          <a:prstGeom prst="rect">
+            <a:avLst/>
+          </a:prstGeom>
+          <a:noFill/>
+          <a:ln>
+            <a:solidFill>
+              <a:schemeClr val="tx1">
+                <a:lumMod val="50000"/>
+              </a:schemeClr>
+            </a:solidFill>
+          </a:ln>
+        </p:spPr>
+        <p:style>
+          <a:lnRef idx="2">
+            <a:schemeClr val="accent1">
+              <a:shade val="50000"/>
+            </a:schemeClr>
+          </a:lnRef>
+          <a:fillRef idx="1">
+            <a:schemeClr val="accent1"/>
+          </a:fillRef>
+          <a:effectRef idx="0">
+            <a:schemeClr val="accent1"/>
+          </a:effectRef>
+          <a:fontRef idx="minor">
+            <a:schemeClr val="lt1"/>
+          </a:fontRef>
+        </p:style>
+        <p:txBody>
+          <a:bodyPr rtlCol="0" anchor="ctr"/>
+          <a:lstStyle/>
+          <a:p>
+            <a:pPr algn="ctr"/>
+            <a:endParaRPr lang="en-US" dirty="0"/>
+          </a:p>
+        </p:txBody>
+      </p:sp>
+      <p:sp>
+        <p:nvSpPr>
+          <p:cNvPr id="42" name="TextBox 41">
+            <a:extLst>
+              <a:ext uri="{FF2B5EF4-FFF2-40B4-BE49-F238E27FC236}">
+                <a16:creationId xmlns:a16="http://schemas.microsoft.com/office/drawing/2014/main" id="{20C07FCC-C94F-1B45-A048-18D6306B9368}"/>
+              </a:ext>
+            </a:extLst>
+          </p:cNvPr>
+          <p:cNvSpPr txBox="1"/>
+          <p:nvPr/>
+        </p:nvSpPr>
+        <p:spPr>
+          <a:xfrm>
+            <a:off x="2492654" y="2356148"/>
+            <a:ext cx="1686487" cy="369332"/>
+          </a:xfrm>
+          <a:prstGeom prst="rect">
+            <a:avLst/>
+          </a:prstGeom>
+          <a:noFill/>
+        </p:spPr>
+        <p:txBody>
+          <a:bodyPr wrap="none" rtlCol="0">
+            <a:spAutoFit/>
+          </a:bodyPr>
+          <a:lstStyle/>
+          <a:p>
+            <a:r>
+              <a:rPr lang="en-US" dirty="0">
+                <a:solidFill>
+                  <a:schemeClr val="accent1"/>
+                </a:solidFill>
+              </a:rPr>
+              <a:t>FULLY BAYESIAN</a:t>
+            </a:r>
+          </a:p>
+        </p:txBody>
+      </p:sp>
+      <p:sp>
+        <p:nvSpPr>
+          <p:cNvPr id="43" name="TextBox 42">
+            <a:extLst>
+              <a:ext uri="{FF2B5EF4-FFF2-40B4-BE49-F238E27FC236}">
+                <a16:creationId xmlns:a16="http://schemas.microsoft.com/office/drawing/2014/main" id="{4A33AAA8-9EB4-554C-AB48-EFA936CC69D4}"/>
+              </a:ext>
+            </a:extLst>
+          </p:cNvPr>
+          <p:cNvSpPr txBox="1"/>
+          <p:nvPr/>
+        </p:nvSpPr>
+        <p:spPr>
+          <a:xfrm>
+            <a:off x="2517131" y="3582464"/>
+            <a:ext cx="1611018" cy="369332"/>
+          </a:xfrm>
+          <a:prstGeom prst="rect">
+            <a:avLst/>
+          </a:prstGeom>
+          <a:noFill/>
+        </p:spPr>
+        <p:txBody>
+          <a:bodyPr wrap="none" rtlCol="0">
+            <a:spAutoFit/>
+          </a:bodyPr>
+          <a:lstStyle/>
+          <a:p>
+            <a:r>
+              <a:rPr lang="en-US" b="1" dirty="0">
+                <a:solidFill>
+                  <a:schemeClr val="accent1"/>
+                </a:solidFill>
+              </a:rPr>
+              <a:t>PROBABILISTIC</a:t>
+            </a:r>
+          </a:p>
+        </p:txBody>
+      </p:sp>
+      <p:sp>
+        <p:nvSpPr>
+          <p:cNvPr id="44" name="TextBox 43">
+            <a:extLst>
+              <a:ext uri="{FF2B5EF4-FFF2-40B4-BE49-F238E27FC236}">
+                <a16:creationId xmlns:a16="http://schemas.microsoft.com/office/drawing/2014/main" id="{F9922D0B-2288-2242-8A00-852D4939AAF5}"/>
+              </a:ext>
+            </a:extLst>
+          </p:cNvPr>
+          <p:cNvSpPr txBox="1"/>
+          <p:nvPr/>
+        </p:nvSpPr>
+        <p:spPr>
+          <a:xfrm>
+            <a:off x="2555651" y="4830168"/>
+            <a:ext cx="1559594" cy="369332"/>
+          </a:xfrm>
+          <a:prstGeom prst="rect">
+            <a:avLst/>
+          </a:prstGeom>
+          <a:noFill/>
+        </p:spPr>
+        <p:txBody>
+          <a:bodyPr wrap="none" rtlCol="0">
+            <a:spAutoFit/>
+          </a:bodyPr>
+          <a:lstStyle/>
+          <a:p>
+            <a:r>
+              <a:rPr lang="en-US" dirty="0">
+                <a:solidFill>
+                  <a:schemeClr val="accent1"/>
+                </a:solidFill>
+              </a:rPr>
+              <a:t>HIERARCHICAL</a:t>
+            </a:r>
+          </a:p>
+        </p:txBody>
+      </p:sp>
+      <mc:AlternateContent xmlns:mc="http://schemas.openxmlformats.org/markup-compatibility/2006">
+        <mc:Choice xmlns:a14="http://schemas.microsoft.com/office/drawing/2010/main" Requires="a14">
+          <p:sp>
+            <p:nvSpPr>
+              <p:cNvPr id="55" name="Alternate Process 54">
+                <a:extLst>
+                  <a:ext uri="{FF2B5EF4-FFF2-40B4-BE49-F238E27FC236}">
+                    <a16:creationId xmlns:a16="http://schemas.microsoft.com/office/drawing/2014/main" id="{1B876362-24E9-364B-9CF6-BCDC010FB11B}"/>
+                  </a:ext>
+                </a:extLst>
+              </p:cNvPr>
+              <p:cNvSpPr/>
+              <p:nvPr/>
+            </p:nvSpPr>
+            <p:spPr>
+              <a:xfrm>
+                <a:off x="4434987" y="2921963"/>
+                <a:ext cx="900000" cy="490936"/>
+              </a:xfrm>
+              <a:prstGeom prst="flowChartAlternateProcess">
+                <a:avLst/>
+              </a:prstGeom>
+              <a:solidFill>
+                <a:schemeClr val="accent5">
+                  <a:alpha val="20000"/>
+                </a:schemeClr>
+              </a:solidFill>
+              <a:ln>
+                <a:solidFill>
+                  <a:srgbClr val="1F3864"/>
+                </a:solidFill>
+              </a:ln>
+            </p:spPr>
+            <p:style>
+              <a:lnRef idx="2">
+                <a:schemeClr val="accent1">
+                  <a:shade val="50000"/>
+                </a:schemeClr>
+              </a:lnRef>
+              <a:fillRef idx="1">
+                <a:schemeClr val="accent1"/>
+              </a:fillRef>
+              <a:effectRef idx="0">
+                <a:schemeClr val="accent1"/>
+              </a:effectRef>
+              <a:fontRef idx="minor">
+                <a:schemeClr val="lt1"/>
+              </a:fontRef>
+            </p:style>
+            <p:txBody>
+              <a:bodyPr rtlCol="0" anchor="ctr"/>
+              <a:lstStyle/>
+              <a:p>
+                <a:pPr algn="ctr"/>
+                <a14:m>
+                  <m:oMathPara xmlns:m="http://schemas.openxmlformats.org/officeDocument/2006/math">
+                    <m:oMathParaPr>
+                      <m:jc m:val="centerGroup"/>
+                    </m:oMathParaPr>
+                    <m:oMath xmlns:m="http://schemas.openxmlformats.org/officeDocument/2006/math">
+                      <m:r>
+                        <a:rPr lang="en-US" b="1" i="1" dirty="0" smtClean="0">
+                          <a:solidFill>
+                            <a:schemeClr val="bg1">
+                              <a:lumMod val="95000"/>
+                              <a:lumOff val="5000"/>
+                            </a:schemeClr>
+                          </a:solidFill>
+                          <a:latin typeface="Cambria Math" panose="02040503050406030204" pitchFamily="18" charset="0"/>
+                        </a:rPr>
+                        <m:t>𝑰𝒐𝑼</m:t>
+                      </m:r>
+                    </m:oMath>
+                  </m:oMathPara>
+                </a14:m>
+                <a:endParaRPr lang="en-US" b="1" dirty="0">
+                  <a:solidFill>
+                    <a:schemeClr val="bg1">
+                      <a:lumMod val="95000"/>
+                      <a:lumOff val="5000"/>
+                    </a:schemeClr>
+                  </a:solidFill>
+                </a:endParaRPr>
+              </a:p>
+            </p:txBody>
+          </p:sp>
+        </mc:Choice>
+        <mc:Fallback>
+          <p:sp>
+            <p:nvSpPr>
+              <p:cNvPr id="55" name="Alternate Process 54">
+                <a:extLst>
+                  <a:ext uri="{FF2B5EF4-FFF2-40B4-BE49-F238E27FC236}">
+                    <a16:creationId xmlns:a16="http://schemas.microsoft.com/office/drawing/2014/main" id="{1B876362-24E9-364B-9CF6-BCDC010FB11B}"/>
+                  </a:ext>
+                </a:extLst>
+              </p:cNvPr>
+              <p:cNvSpPr>
+                <a:spLocks noRot="1" noChangeAspect="1" noMove="1" noResize="1" noEditPoints="1" noAdjustHandles="1" noChangeArrowheads="1" noChangeShapeType="1" noTextEdit="1"/>
+              </p:cNvSpPr>
+              <p:nvPr/>
+            </p:nvSpPr>
+            <p:spPr>
+              <a:xfrm>
+                <a:off x="4434987" y="2921963"/>
+                <a:ext cx="900000" cy="490936"/>
+              </a:xfrm>
+              <a:prstGeom prst="flowChartAlternateProcess">
+                <a:avLst/>
+              </a:prstGeom>
+              <a:blipFill>
+                <a:blip r:embed="rId8"/>
+                <a:stretch>
+                  <a:fillRect/>
+                </a:stretch>
+              </a:blipFill>
+              <a:ln>
+                <a:solidFill>
+                  <a:srgbClr val="1F3864"/>
+                </a:solidFill>
+              </a:ln>
+            </p:spPr>
+            <p:txBody>
+              <a:bodyPr/>
+              <a:lstStyle/>
+              <a:p>
+                <a:r>
+                  <a:rPr lang="en-US">
+                    <a:noFill/>
+                  </a:rPr>
+                  <a:t> </a:t>
+                </a:r>
+              </a:p>
+            </p:txBody>
+          </p:sp>
+        </mc:Fallback>
+      </mc:AlternateContent>
+      <mc:AlternateContent xmlns:mc="http://schemas.openxmlformats.org/markup-compatibility/2006">
+        <mc:Choice xmlns:a14="http://schemas.microsoft.com/office/drawing/2010/main" Requires="a14">
+          <p:sp>
+            <p:nvSpPr>
+              <p:cNvPr id="56" name="Alternate Process 55">
+                <a:extLst>
+                  <a:ext uri="{FF2B5EF4-FFF2-40B4-BE49-F238E27FC236}">
+                    <a16:creationId xmlns:a16="http://schemas.microsoft.com/office/drawing/2014/main" id="{17113D29-8FBE-154D-8A47-ABEDDEE74C11}"/>
+                  </a:ext>
+                </a:extLst>
+              </p:cNvPr>
+              <p:cNvSpPr/>
+              <p:nvPr/>
+            </p:nvSpPr>
+            <p:spPr>
+              <a:xfrm>
+                <a:off x="4448394" y="3790448"/>
+                <a:ext cx="900000" cy="490936"/>
+              </a:xfrm>
+              <a:prstGeom prst="flowChartAlternateProcess">
+                <a:avLst/>
+              </a:prstGeom>
+              <a:solidFill>
+                <a:schemeClr val="accent5">
+                  <a:alpha val="20000"/>
+                </a:schemeClr>
+              </a:solidFill>
+              <a:ln>
+                <a:solidFill>
+                  <a:srgbClr val="1F3864"/>
+                </a:solidFill>
+              </a:ln>
+            </p:spPr>
+            <p:style>
+              <a:lnRef idx="2">
+                <a:schemeClr val="accent1">
+                  <a:shade val="50000"/>
+                </a:schemeClr>
+              </a:lnRef>
+              <a:fillRef idx="1">
+                <a:schemeClr val="accent1"/>
+              </a:fillRef>
+              <a:effectRef idx="0">
+                <a:schemeClr val="accent1"/>
+              </a:effectRef>
+              <a:fontRef idx="minor">
+                <a:schemeClr val="lt1"/>
+              </a:fontRef>
+            </p:style>
+            <p:txBody>
+              <a:bodyPr rtlCol="0" anchor="ctr"/>
+              <a:lstStyle/>
+              <a:p>
+                <a:pPr algn="ctr"/>
+                <a14:m>
+                  <m:oMathPara xmlns:m="http://schemas.openxmlformats.org/officeDocument/2006/math">
+                    <m:oMathParaPr>
+                      <m:jc m:val="centerGroup"/>
+                    </m:oMathParaPr>
+                    <m:oMath xmlns:m="http://schemas.openxmlformats.org/officeDocument/2006/math">
+                      <m:r>
+                        <a:rPr lang="en-US" b="0" i="1" smtClean="0">
+                          <a:latin typeface="Cambria Math" panose="02040503050406030204" pitchFamily="18" charset="0"/>
+                        </a:rPr>
+                        <m:t>𝐶</m:t>
+                      </m:r>
+                      <m:sSup>
+                        <m:sSupPr>
+                          <m:ctrlPr>
+                            <a:rPr lang="en-US" b="0" i="1" smtClean="0">
+                              <a:latin typeface="Cambria Math" panose="02040503050406030204" pitchFamily="18" charset="0"/>
+                            </a:rPr>
+                          </m:ctrlPr>
+                        </m:sSupPr>
+                        <m:e>
+                          <m:r>
+                            <a:rPr lang="en-US" b="0" i="1" smtClean="0">
+                              <a:latin typeface="Cambria Math" panose="02040503050406030204" pitchFamily="18" charset="0"/>
+                            </a:rPr>
+                            <m:t>𝑉</m:t>
+                          </m:r>
+                        </m:e>
+                        <m:sup>
+                          <m:r>
+                            <a:rPr lang="en-US" b="0" i="1" smtClean="0">
+                              <a:latin typeface="Cambria Math" panose="02040503050406030204" pitchFamily="18" charset="0"/>
+                            </a:rPr>
+                            <m:t>−1</m:t>
+                          </m:r>
+                        </m:sup>
+                      </m:sSup>
+                    </m:oMath>
+                  </m:oMathPara>
+                </a14:m>
+                <a:endParaRPr lang="en-US" dirty="0"/>
+              </a:p>
+            </p:txBody>
+          </p:sp>
+        </mc:Choice>
+        <mc:Fallback>
+          <p:sp>
+            <p:nvSpPr>
+              <p:cNvPr id="56" name="Alternate Process 55">
+                <a:extLst>
+                  <a:ext uri="{FF2B5EF4-FFF2-40B4-BE49-F238E27FC236}">
+                    <a16:creationId xmlns:a16="http://schemas.microsoft.com/office/drawing/2014/main" id="{17113D29-8FBE-154D-8A47-ABEDDEE74C11}"/>
+                  </a:ext>
+                </a:extLst>
+              </p:cNvPr>
+              <p:cNvSpPr>
+                <a:spLocks noRot="1" noChangeAspect="1" noMove="1" noResize="1" noEditPoints="1" noAdjustHandles="1" noChangeArrowheads="1" noChangeShapeType="1" noTextEdit="1"/>
+              </p:cNvSpPr>
+              <p:nvPr/>
+            </p:nvSpPr>
+            <p:spPr>
+              <a:xfrm>
+                <a:off x="4448394" y="3790448"/>
+                <a:ext cx="900000" cy="490936"/>
+              </a:xfrm>
+              <a:prstGeom prst="flowChartAlternateProcess">
+                <a:avLst/>
+              </a:prstGeom>
+              <a:blipFill>
+                <a:blip r:embed="rId9"/>
+                <a:stretch>
+                  <a:fillRect/>
+                </a:stretch>
+              </a:blipFill>
+              <a:ln>
+                <a:solidFill>
+                  <a:srgbClr val="1F3864"/>
+                </a:solidFill>
+              </a:ln>
+            </p:spPr>
+            <p:txBody>
+              <a:bodyPr/>
+              <a:lstStyle/>
+              <a:p>
+                <a:r>
+                  <a:rPr lang="en-US">
+                    <a:noFill/>
+                  </a:rPr>
+                  <a:t> </a:t>
+                </a:r>
+              </a:p>
+            </p:txBody>
+          </p:sp>
+        </mc:Fallback>
+      </mc:AlternateContent>
+      <p:sp>
+        <p:nvSpPr>
+          <p:cNvPr id="61" name="Rectangle 60">
+            <a:extLst>
+              <a:ext uri="{FF2B5EF4-FFF2-40B4-BE49-F238E27FC236}">
+                <a16:creationId xmlns:a16="http://schemas.microsoft.com/office/drawing/2014/main" id="{D37E1CEC-782F-1446-AC23-D35471C2573B}"/>
+              </a:ext>
+            </a:extLst>
+          </p:cNvPr>
+          <p:cNvSpPr/>
+          <p:nvPr/>
+        </p:nvSpPr>
+        <p:spPr>
+          <a:xfrm>
+            <a:off x="9446645" y="1189770"/>
+            <a:ext cx="1964285" cy="1906082"/>
+          </a:xfrm>
+          <a:prstGeom prst="rect">
+            <a:avLst/>
+          </a:prstGeom>
+          <a:noFill/>
+          <a:ln w="25400">
+            <a:noFill/>
+          </a:ln>
+        </p:spPr>
+        <p:style>
+          <a:lnRef idx="2">
+            <a:schemeClr val="accent1">
+              <a:shade val="50000"/>
+            </a:schemeClr>
+          </a:lnRef>
+          <a:fillRef idx="1">
+            <a:schemeClr val="accent1"/>
+          </a:fillRef>
+          <a:effectRef idx="0">
+            <a:schemeClr val="accent1"/>
+          </a:effectRef>
+          <a:fontRef idx="minor">
+            <a:schemeClr val="lt1"/>
+          </a:fontRef>
+        </p:style>
+        <p:txBody>
+          <a:bodyPr rtlCol="0" anchor="ctr"/>
+          <a:lstStyle/>
+          <a:p>
+            <a:pPr marL="342900" indent="-342900">
+              <a:buFont typeface="Arial" panose="020B0604020202020204" pitchFamily="34" charset="0"/>
+              <a:buChar char="•"/>
+            </a:pPr>
+            <a:endParaRPr lang="en-US" dirty="0">
+              <a:solidFill>
+                <a:schemeClr val="accent1"/>
+              </a:solidFill>
+            </a:endParaRPr>
+          </a:p>
+          <a:p>
+            <a:pPr marL="342900" indent="-342900">
+              <a:buFont typeface="Arial" panose="020B0604020202020204" pitchFamily="34" charset="0"/>
+              <a:buChar char="•"/>
+            </a:pPr>
+            <a:endParaRPr lang="en-US" dirty="0">
+              <a:solidFill>
+                <a:schemeClr val="accent1"/>
+              </a:solidFill>
+            </a:endParaRPr>
+          </a:p>
+          <a:p>
+            <a:pPr marL="342900" indent="-342900">
+              <a:buFont typeface="+mj-lt"/>
+              <a:buAutoNum type="arabicPeriod"/>
+            </a:pPr>
+            <a:r>
+              <a:rPr lang="en-US" dirty="0">
+                <a:solidFill>
+                  <a:schemeClr val="accent1"/>
+                </a:solidFill>
+              </a:rPr>
+              <a:t>MANUAL</a:t>
+            </a:r>
+          </a:p>
+          <a:p>
+            <a:pPr marL="342900" indent="-342900">
+              <a:buFont typeface="+mj-lt"/>
+              <a:buAutoNum type="arabicPeriod"/>
+            </a:pPr>
+            <a:r>
+              <a:rPr lang="en-US" dirty="0">
+                <a:solidFill>
+                  <a:schemeClr val="accent1"/>
+                </a:solidFill>
+              </a:rPr>
+              <a:t>BASE</a:t>
+            </a:r>
+          </a:p>
+          <a:p>
+            <a:pPr marL="342900" indent="-342900">
+              <a:buFont typeface="+mj-lt"/>
+              <a:buAutoNum type="arabicPeriod"/>
+            </a:pPr>
+            <a:r>
+              <a:rPr lang="en-US" b="1" dirty="0">
+                <a:solidFill>
+                  <a:schemeClr val="accent1"/>
+                </a:solidFill>
+              </a:rPr>
+              <a:t>VARIABLE</a:t>
+            </a:r>
+          </a:p>
+          <a:p>
+            <a:pPr marL="342900" indent="-342900">
+              <a:buFont typeface="+mj-lt"/>
+              <a:buAutoNum type="arabicPeriod"/>
+            </a:pPr>
+            <a:r>
+              <a:rPr lang="en-US" dirty="0">
+                <a:solidFill>
+                  <a:schemeClr val="accent1"/>
+                </a:solidFill>
+              </a:rPr>
+              <a:t>INSTANCE WEIGHTING</a:t>
+            </a:r>
+          </a:p>
+          <a:p>
+            <a:pPr algn="ctr"/>
+            <a:endParaRPr lang="en-US" dirty="0">
+              <a:solidFill>
+                <a:schemeClr val="accent1"/>
+              </a:solidFill>
+            </a:endParaRPr>
+          </a:p>
+          <a:p>
+            <a:pPr marL="342900" indent="-342900" algn="ctr">
+              <a:buFont typeface="+mj-lt"/>
+              <a:buAutoNum type="arabicPeriod"/>
+            </a:pPr>
+            <a:endParaRPr lang="en-US" dirty="0">
+              <a:solidFill>
+                <a:schemeClr val="accent1"/>
+              </a:solidFill>
+            </a:endParaRPr>
+          </a:p>
+        </p:txBody>
+      </p:sp>
+      <p:sp>
+        <p:nvSpPr>
+          <p:cNvPr id="62" name="Rectangle 61">
+            <a:extLst>
+              <a:ext uri="{FF2B5EF4-FFF2-40B4-BE49-F238E27FC236}">
+                <a16:creationId xmlns:a16="http://schemas.microsoft.com/office/drawing/2014/main" id="{F2F28CD2-8252-6E47-86B5-22B246AD9A69}"/>
+              </a:ext>
+            </a:extLst>
+          </p:cNvPr>
+          <p:cNvSpPr/>
+          <p:nvPr/>
+        </p:nvSpPr>
+        <p:spPr>
+          <a:xfrm>
+            <a:off x="9415968" y="4046127"/>
+            <a:ext cx="1964285" cy="2145565"/>
+          </a:xfrm>
+          <a:prstGeom prst="rect">
+            <a:avLst/>
+          </a:prstGeom>
+          <a:noFill/>
+          <a:ln w="25400">
+            <a:noFill/>
+          </a:ln>
+        </p:spPr>
+        <p:style>
+          <a:lnRef idx="2">
+            <a:schemeClr val="accent1">
+              <a:shade val="50000"/>
+            </a:schemeClr>
+          </a:lnRef>
+          <a:fillRef idx="1">
+            <a:schemeClr val="accent1"/>
+          </a:fillRef>
+          <a:effectRef idx="0">
+            <a:schemeClr val="accent1"/>
+          </a:effectRef>
+          <a:fontRef idx="minor">
+            <a:schemeClr val="lt1"/>
+          </a:fontRef>
+        </p:style>
+        <p:txBody>
+          <a:bodyPr rtlCol="0" anchor="ctr"/>
+          <a:lstStyle/>
+          <a:p>
+            <a:pPr marL="342900" indent="-342900">
+              <a:buFont typeface="+mj-lt"/>
+              <a:buAutoNum type="arabicPeriod"/>
+            </a:pPr>
+            <a:r>
+              <a:rPr lang="en-US" dirty="0">
+                <a:solidFill>
+                  <a:schemeClr val="accent1"/>
+                </a:solidFill>
+              </a:rPr>
+              <a:t>MANUAL</a:t>
+            </a:r>
+          </a:p>
+          <a:p>
+            <a:pPr marL="342900" indent="-342900">
+              <a:buFont typeface="+mj-lt"/>
+              <a:buAutoNum type="arabicPeriod"/>
+            </a:pPr>
+            <a:r>
+              <a:rPr lang="en-US" dirty="0">
+                <a:solidFill>
+                  <a:schemeClr val="accent1"/>
+                </a:solidFill>
+              </a:rPr>
+              <a:t>BASE</a:t>
+            </a:r>
+          </a:p>
+          <a:p>
+            <a:pPr marL="342900" indent="-342900">
+              <a:buFont typeface="+mj-lt"/>
+              <a:buAutoNum type="arabicPeriod"/>
+            </a:pPr>
+            <a:r>
+              <a:rPr lang="en-US" b="1" dirty="0">
+                <a:solidFill>
+                  <a:schemeClr val="accent1"/>
+                </a:solidFill>
+              </a:rPr>
+              <a:t>VARIABLE</a:t>
+            </a:r>
+          </a:p>
+          <a:p>
+            <a:pPr marL="342900" indent="-342900">
+              <a:buFont typeface="+mj-lt"/>
+              <a:buAutoNum type="arabicPeriod"/>
+            </a:pPr>
+            <a:r>
+              <a:rPr lang="en-US" b="1" dirty="0">
+                <a:solidFill>
+                  <a:schemeClr val="accent1"/>
+                </a:solidFill>
+              </a:rPr>
+              <a:t>INTERACTION</a:t>
+            </a:r>
+          </a:p>
+          <a:p>
+            <a:pPr marL="342900" indent="-342900">
+              <a:buFont typeface="+mj-lt"/>
+              <a:buAutoNum type="arabicPeriod"/>
+            </a:pPr>
+            <a:r>
+              <a:rPr lang="en-US" dirty="0">
+                <a:solidFill>
+                  <a:schemeClr val="accent1"/>
+                </a:solidFill>
+              </a:rPr>
+              <a:t>INSTANCE WEIGHTING</a:t>
+            </a:r>
+          </a:p>
+        </p:txBody>
+      </p:sp>
+      <p:sp>
+        <p:nvSpPr>
+          <p:cNvPr id="65" name="TextBox 64">
+            <a:extLst>
+              <a:ext uri="{FF2B5EF4-FFF2-40B4-BE49-F238E27FC236}">
+                <a16:creationId xmlns:a16="http://schemas.microsoft.com/office/drawing/2014/main" id="{587E9797-F4E9-4340-95BB-A431C2590C23}"/>
+              </a:ext>
+            </a:extLst>
+          </p:cNvPr>
+          <p:cNvSpPr txBox="1"/>
+          <p:nvPr/>
+        </p:nvSpPr>
+        <p:spPr>
+          <a:xfrm>
+            <a:off x="9298578" y="3387737"/>
+            <a:ext cx="2199064" cy="369332"/>
+          </a:xfrm>
+          <a:prstGeom prst="rect">
+            <a:avLst/>
+          </a:prstGeom>
+          <a:noFill/>
+        </p:spPr>
+        <p:txBody>
+          <a:bodyPr wrap="none" rtlCol="0">
+            <a:spAutoFit/>
+          </a:bodyPr>
+          <a:lstStyle/>
+          <a:p>
+            <a:r>
+              <a:rPr lang="en-US" dirty="0">
+                <a:solidFill>
+                  <a:schemeClr val="bg1">
+                    <a:lumMod val="50000"/>
+                    <a:lumOff val="50000"/>
+                  </a:schemeClr>
+                </a:solidFill>
+              </a:rPr>
+              <a:t>STATISTICAL MODELS</a:t>
+            </a:r>
+          </a:p>
+        </p:txBody>
+      </p:sp>
+      <p:sp>
+        <p:nvSpPr>
+          <p:cNvPr id="66" name="Left-Right Arrow Callout 65">
+            <a:extLst>
+              <a:ext uri="{FF2B5EF4-FFF2-40B4-BE49-F238E27FC236}">
+                <a16:creationId xmlns:a16="http://schemas.microsoft.com/office/drawing/2014/main" id="{C7466F2F-B454-9D49-A9A0-83F9EF681125}"/>
+              </a:ext>
+            </a:extLst>
+          </p:cNvPr>
+          <p:cNvSpPr/>
+          <p:nvPr/>
+        </p:nvSpPr>
+        <p:spPr>
+          <a:xfrm rot="16200000">
+            <a:off x="9984190" y="2479566"/>
+            <a:ext cx="774889" cy="2199065"/>
+          </a:xfrm>
+          <a:prstGeom prst="leftRightArrowCallout">
+            <a:avLst/>
+          </a:prstGeom>
+          <a:solidFill>
+            <a:schemeClr val="accent1">
+              <a:alpha val="5000"/>
+            </a:schemeClr>
+          </a:solidFill>
+        </p:spPr>
+        <p:style>
+          <a:lnRef idx="2">
+            <a:schemeClr val="accent1">
+              <a:shade val="50000"/>
+            </a:schemeClr>
+          </a:lnRef>
+          <a:fillRef idx="1">
+            <a:schemeClr val="accent1"/>
+          </a:fillRef>
+          <a:effectRef idx="0">
+            <a:schemeClr val="accent1"/>
+          </a:effectRef>
+          <a:fontRef idx="minor">
+            <a:schemeClr val="lt1"/>
+          </a:fontRef>
+        </p:style>
+        <p:txBody>
+          <a:bodyPr rtlCol="0" anchor="ctr"/>
+          <a:lstStyle/>
+          <a:p>
+            <a:pPr algn="ctr"/>
+            <a:endParaRPr lang="en-US"/>
+          </a:p>
+        </p:txBody>
+      </p:sp>
+      <p:sp>
+        <p:nvSpPr>
+          <p:cNvPr id="68" name="Rectangle 67">
+            <a:extLst>
+              <a:ext uri="{FF2B5EF4-FFF2-40B4-BE49-F238E27FC236}">
+                <a16:creationId xmlns:a16="http://schemas.microsoft.com/office/drawing/2014/main" id="{A370DC2C-5C9F-E041-BAD1-208A1DF086BD}"/>
+              </a:ext>
+            </a:extLst>
+          </p:cNvPr>
+          <p:cNvSpPr/>
+          <p:nvPr/>
+        </p:nvSpPr>
+        <p:spPr>
+          <a:xfrm>
+            <a:off x="9888268" y="125041"/>
+            <a:ext cx="2080591" cy="729335"/>
+          </a:xfrm>
+          <a:prstGeom prst="rect">
+            <a:avLst/>
+          </a:prstGeom>
+          <a:ln>
+            <a:noFill/>
+          </a:ln>
+        </p:spPr>
+        <p:style>
+          <a:lnRef idx="2">
+            <a:schemeClr val="dk1">
+              <a:shade val="50000"/>
+            </a:schemeClr>
+          </a:lnRef>
+          <a:fillRef idx="1">
+            <a:schemeClr val="dk1"/>
+          </a:fillRef>
+          <a:effectRef idx="0">
+            <a:schemeClr val="dk1"/>
+          </a:effectRef>
+          <a:fontRef idx="minor">
+            <a:schemeClr val="lt1"/>
+          </a:fontRef>
+        </p:style>
+        <p:txBody>
+          <a:bodyPr rtlCol="0" anchor="ctr"/>
+          <a:lstStyle/>
+          <a:p>
+            <a:pPr algn="ctr"/>
+            <a:endParaRPr lang="en-US"/>
+          </a:p>
+        </p:txBody>
+      </p:sp>
+    </p:spTree>
+    <p:extLst>
+      <p:ext uri="{BB962C8B-B14F-4D97-AF65-F5344CB8AC3E}">
+        <p14:creationId xmlns:p14="http://schemas.microsoft.com/office/powerpoint/2010/main" val="338186666"/>
       </p:ext>
     </p:extLst>
   </p:cSld>

</xml_diff>

<commit_message>
mlmi workshop final changes 11092020
</commit_message>
<xml_diff>
--- a/mlmi-workshop/MLMI Presentation-JMS.pptx
+++ b/mlmi-workshop/MLMI Presentation-JMS.pptx
@@ -10424,8 +10424,8 @@
           </a:p>
         </p:txBody>
       </p:sp>
-      <mc:AlternateContent xmlns:mc="http://schemas.openxmlformats.org/markup-compatibility/2006">
-        <mc:Choice xmlns:a14="http://schemas.microsoft.com/office/drawing/2010/main" Requires="a14">
+      <mc:AlternateContent xmlns:mc="http://schemas.openxmlformats.org/markup-compatibility/2006" xmlns:a14="http://schemas.microsoft.com/office/drawing/2010/main">
+        <mc:Choice Requires="a14">
           <p:sp>
             <p:nvSpPr>
               <p:cNvPr id="55" name="Alternate Process 54">
@@ -10511,7 +10511,7 @@
             </p:txBody>
           </p:sp>
         </mc:Choice>
-        <mc:Fallback>
+        <mc:Fallback xmlns="">
           <p:sp>
             <p:nvSpPr>
               <p:cNvPr id="55" name="Alternate Process 54">
@@ -10561,8 +10561,8 @@
           </p:sp>
         </mc:Fallback>
       </mc:AlternateContent>
-      <mc:AlternateContent xmlns:mc="http://schemas.openxmlformats.org/markup-compatibility/2006">
-        <mc:Choice xmlns:a14="http://schemas.microsoft.com/office/drawing/2010/main" Requires="a14">
+      <mc:AlternateContent xmlns:mc="http://schemas.openxmlformats.org/markup-compatibility/2006" xmlns:a14="http://schemas.microsoft.com/office/drawing/2010/main">
+        <mc:Choice Requires="a14">
           <p:sp>
             <p:nvSpPr>
               <p:cNvPr id="56" name="Alternate Process 55">
@@ -10660,7 +10660,7 @@
             </p:txBody>
           </p:sp>
         </mc:Choice>
-        <mc:Fallback>
+        <mc:Fallback xmlns="">
           <p:sp>
             <p:nvSpPr>
               <p:cNvPr id="56" name="Alternate Process 55">

</xml_diff>